<commit_message>
updating the realtionships in data model
</commit_message>
<xml_diff>
--- a/Units_diagram.pptx
+++ b/Units_diagram.pptx
@@ -117,7 +117,7 @@
 <file path=ppt/revisionInfo.xml><?xml version="1.0" encoding="utf-8"?>
 <p1510:revInfo xmlns:a="http://schemas.openxmlformats.org/drawingml/2006/main" xmlns:r="http://schemas.openxmlformats.org/officeDocument/2006/relationships" xmlns:p1510="http://schemas.microsoft.com/office/powerpoint/2015/10/main">
   <p1510:revLst>
-    <p1510:client id="{166D12EF-58EE-6C4C-9A24-99C33C59FE65}" v="549" dt="2024-11-15T18:48:44.296"/>
+    <p1510:client id="{166D12EF-58EE-6C4C-9A24-99C33C59FE65}" v="565" dt="2024-11-15T20:54:53.311"/>
   </p1510:revLst>
 </p1510:revInfo>
 </file>
@@ -127,7 +127,7 @@
   <pc:docChgLst>
     <pc:chgData name="Montecino, Diego" userId="a795c42d-832a-4dce-b1d8-09bac981a9d2" providerId="ADAL" clId="{166D12EF-58EE-6C4C-9A24-99C33C59FE65}"/>
     <pc:docChg chg="undo custSel addSld delSld modSld sldOrd">
-      <pc:chgData name="Montecino, Diego" userId="a795c42d-832a-4dce-b1d8-09bac981a9d2" providerId="ADAL" clId="{166D12EF-58EE-6C4C-9A24-99C33C59FE65}" dt="2024-11-15T18:48:44.296" v="1114" actId="5736"/>
+      <pc:chgData name="Montecino, Diego" userId="a795c42d-832a-4dce-b1d8-09bac981a9d2" providerId="ADAL" clId="{166D12EF-58EE-6C4C-9A24-99C33C59FE65}" dt="2024-11-15T20:54:53.310" v="1137" actId="5736"/>
       <pc:docMkLst>
         <pc:docMk/>
       </pc:docMkLst>
@@ -522,7 +522,7 @@
         </pc:cxnChg>
       </pc:sldChg>
       <pc:sldChg chg="addSp delSp modSp add mod ord">
-        <pc:chgData name="Montecino, Diego" userId="a795c42d-832a-4dce-b1d8-09bac981a9d2" providerId="ADAL" clId="{166D12EF-58EE-6C4C-9A24-99C33C59FE65}" dt="2024-11-15T18:48:44.296" v="1114" actId="5736"/>
+        <pc:chgData name="Montecino, Diego" userId="a795c42d-832a-4dce-b1d8-09bac981a9d2" providerId="ADAL" clId="{166D12EF-58EE-6C4C-9A24-99C33C59FE65}" dt="2024-11-15T20:54:53.310" v="1137" actId="5736"/>
         <pc:sldMkLst>
           <pc:docMk/>
           <pc:sldMk cId="1576011338" sldId="258"/>
@@ -544,7 +544,7 @@
           </ac:spMkLst>
         </pc:spChg>
         <pc:spChg chg="add mod">
-          <ac:chgData name="Montecino, Diego" userId="a795c42d-832a-4dce-b1d8-09bac981a9d2" providerId="ADAL" clId="{166D12EF-58EE-6C4C-9A24-99C33C59FE65}" dt="2024-11-15T18:48:44.296" v="1114" actId="5736"/>
+          <ac:chgData name="Montecino, Diego" userId="a795c42d-832a-4dce-b1d8-09bac981a9d2" providerId="ADAL" clId="{166D12EF-58EE-6C4C-9A24-99C33C59FE65}" dt="2024-11-15T20:54:53.310" v="1137" actId="5736"/>
           <ac:spMkLst>
             <pc:docMk/>
             <pc:sldMk cId="1576011338" sldId="258"/>
@@ -560,7 +560,7 @@
           </ac:spMkLst>
         </pc:spChg>
         <pc:spChg chg="add mod">
-          <ac:chgData name="Montecino, Diego" userId="a795c42d-832a-4dce-b1d8-09bac981a9d2" providerId="ADAL" clId="{166D12EF-58EE-6C4C-9A24-99C33C59FE65}" dt="2024-11-15T18:48:44.296" v="1114" actId="5736"/>
+          <ac:chgData name="Montecino, Diego" userId="a795c42d-832a-4dce-b1d8-09bac981a9d2" providerId="ADAL" clId="{166D12EF-58EE-6C4C-9A24-99C33C59FE65}" dt="2024-11-15T20:54:53.310" v="1137" actId="5736"/>
           <ac:spMkLst>
             <pc:docMk/>
             <pc:sldMk cId="1576011338" sldId="258"/>
@@ -584,7 +584,7 @@
           </ac:spMkLst>
         </pc:spChg>
         <pc:spChg chg="add mod">
-          <ac:chgData name="Montecino, Diego" userId="a795c42d-832a-4dce-b1d8-09bac981a9d2" providerId="ADAL" clId="{166D12EF-58EE-6C4C-9A24-99C33C59FE65}" dt="2024-11-15T18:48:44.296" v="1114" actId="5736"/>
+          <ac:chgData name="Montecino, Diego" userId="a795c42d-832a-4dce-b1d8-09bac981a9d2" providerId="ADAL" clId="{166D12EF-58EE-6C4C-9A24-99C33C59FE65}" dt="2024-11-15T20:54:53.310" v="1137" actId="5736"/>
           <ac:spMkLst>
             <pc:docMk/>
             <pc:sldMk cId="1576011338" sldId="258"/>
@@ -664,7 +664,7 @@
           </ac:spMkLst>
         </pc:spChg>
         <pc:spChg chg="add mod">
-          <ac:chgData name="Montecino, Diego" userId="a795c42d-832a-4dce-b1d8-09bac981a9d2" providerId="ADAL" clId="{166D12EF-58EE-6C4C-9A24-99C33C59FE65}" dt="2024-11-15T18:48:44.296" v="1114" actId="5736"/>
+          <ac:chgData name="Montecino, Diego" userId="a795c42d-832a-4dce-b1d8-09bac981a9d2" providerId="ADAL" clId="{166D12EF-58EE-6C4C-9A24-99C33C59FE65}" dt="2024-11-15T20:54:53.310" v="1137" actId="5736"/>
           <ac:spMkLst>
             <pc:docMk/>
             <pc:sldMk cId="1576011338" sldId="258"/>
@@ -672,7 +672,7 @@
           </ac:spMkLst>
         </pc:spChg>
         <pc:spChg chg="add del mod">
-          <ac:chgData name="Montecino, Diego" userId="a795c42d-832a-4dce-b1d8-09bac981a9d2" providerId="ADAL" clId="{166D12EF-58EE-6C4C-9A24-99C33C59FE65}" dt="2024-11-15T18:48:44.296" v="1114" actId="5736"/>
+          <ac:chgData name="Montecino, Diego" userId="a795c42d-832a-4dce-b1d8-09bac981a9d2" providerId="ADAL" clId="{166D12EF-58EE-6C4C-9A24-99C33C59FE65}" dt="2024-11-15T20:54:53.310" v="1137" actId="5736"/>
           <ac:spMkLst>
             <pc:docMk/>
             <pc:sldMk cId="1576011338" sldId="258"/>
@@ -680,7 +680,7 @@
           </ac:spMkLst>
         </pc:spChg>
         <pc:spChg chg="add mod">
-          <ac:chgData name="Montecino, Diego" userId="a795c42d-832a-4dce-b1d8-09bac981a9d2" providerId="ADAL" clId="{166D12EF-58EE-6C4C-9A24-99C33C59FE65}" dt="2024-11-15T18:48:44.296" v="1114" actId="5736"/>
+          <ac:chgData name="Montecino, Diego" userId="a795c42d-832a-4dce-b1d8-09bac981a9d2" providerId="ADAL" clId="{166D12EF-58EE-6C4C-9A24-99C33C59FE65}" dt="2024-11-15T20:54:53.310" v="1137" actId="5736"/>
           <ac:spMkLst>
             <pc:docMk/>
             <pc:sldMk cId="1576011338" sldId="258"/>
@@ -688,7 +688,7 @@
           </ac:spMkLst>
         </pc:spChg>
         <pc:spChg chg="add mod">
-          <ac:chgData name="Montecino, Diego" userId="a795c42d-832a-4dce-b1d8-09bac981a9d2" providerId="ADAL" clId="{166D12EF-58EE-6C4C-9A24-99C33C59FE65}" dt="2024-11-15T18:48:44.296" v="1114" actId="5736"/>
+          <ac:chgData name="Montecino, Diego" userId="a795c42d-832a-4dce-b1d8-09bac981a9d2" providerId="ADAL" clId="{166D12EF-58EE-6C4C-9A24-99C33C59FE65}" dt="2024-11-15T20:54:53.310" v="1137" actId="5736"/>
           <ac:spMkLst>
             <pc:docMk/>
             <pc:sldMk cId="1576011338" sldId="258"/>
@@ -696,7 +696,7 @@
           </ac:spMkLst>
         </pc:spChg>
         <pc:spChg chg="add mod">
-          <ac:chgData name="Montecino, Diego" userId="a795c42d-832a-4dce-b1d8-09bac981a9d2" providerId="ADAL" clId="{166D12EF-58EE-6C4C-9A24-99C33C59FE65}" dt="2024-11-15T18:48:44.296" v="1114" actId="5736"/>
+          <ac:chgData name="Montecino, Diego" userId="a795c42d-832a-4dce-b1d8-09bac981a9d2" providerId="ADAL" clId="{166D12EF-58EE-6C4C-9A24-99C33C59FE65}" dt="2024-11-15T20:54:53.310" v="1137" actId="5736"/>
           <ac:spMkLst>
             <pc:docMk/>
             <pc:sldMk cId="1576011338" sldId="258"/>
@@ -704,7 +704,7 @@
           </ac:spMkLst>
         </pc:spChg>
         <pc:spChg chg="add del mod">
-          <ac:chgData name="Montecino, Diego" userId="a795c42d-832a-4dce-b1d8-09bac981a9d2" providerId="ADAL" clId="{166D12EF-58EE-6C4C-9A24-99C33C59FE65}" dt="2024-11-15T18:48:44.296" v="1114" actId="5736"/>
+          <ac:chgData name="Montecino, Diego" userId="a795c42d-832a-4dce-b1d8-09bac981a9d2" providerId="ADAL" clId="{166D12EF-58EE-6C4C-9A24-99C33C59FE65}" dt="2024-11-15T20:54:53.310" v="1137" actId="5736"/>
           <ac:spMkLst>
             <pc:docMk/>
             <pc:sldMk cId="1576011338" sldId="258"/>
@@ -719,8 +719,16 @@
             <ac:spMk id="47" creationId="{19F88549-75D8-A564-BFF8-5D049270E8E8}"/>
           </ac:spMkLst>
         </pc:spChg>
+        <pc:spChg chg="add mod">
+          <ac:chgData name="Montecino, Diego" userId="a795c42d-832a-4dce-b1d8-09bac981a9d2" providerId="ADAL" clId="{166D12EF-58EE-6C4C-9A24-99C33C59FE65}" dt="2024-11-15T20:54:53.310" v="1137" actId="5736"/>
+          <ac:spMkLst>
+            <pc:docMk/>
+            <pc:sldMk cId="1576011338" sldId="258"/>
+            <ac:spMk id="63" creationId="{03F25ECE-0F68-B601-6658-CB4EE9EF98F1}"/>
+          </ac:spMkLst>
+        </pc:spChg>
         <pc:spChg chg="add del mod">
-          <ac:chgData name="Montecino, Diego" userId="a795c42d-832a-4dce-b1d8-09bac981a9d2" providerId="ADAL" clId="{166D12EF-58EE-6C4C-9A24-99C33C59FE65}" dt="2024-11-15T18:48:44.296" v="1114" actId="5736"/>
+          <ac:chgData name="Montecino, Diego" userId="a795c42d-832a-4dce-b1d8-09bac981a9d2" providerId="ADAL" clId="{166D12EF-58EE-6C4C-9A24-99C33C59FE65}" dt="2024-11-15T20:54:53.310" v="1137" actId="5736"/>
           <ac:spMkLst>
             <pc:docMk/>
             <pc:sldMk cId="1576011338" sldId="258"/>
@@ -728,7 +736,7 @@
           </ac:spMkLst>
         </pc:spChg>
         <pc:spChg chg="add del mod">
-          <ac:chgData name="Montecino, Diego" userId="a795c42d-832a-4dce-b1d8-09bac981a9d2" providerId="ADAL" clId="{166D12EF-58EE-6C4C-9A24-99C33C59FE65}" dt="2024-11-15T18:48:44.296" v="1114" actId="5736"/>
+          <ac:chgData name="Montecino, Diego" userId="a795c42d-832a-4dce-b1d8-09bac981a9d2" providerId="ADAL" clId="{166D12EF-58EE-6C4C-9A24-99C33C59FE65}" dt="2024-11-15T20:54:53.310" v="1137" actId="5736"/>
           <ac:spMkLst>
             <pc:docMk/>
             <pc:sldMk cId="1576011338" sldId="258"/>
@@ -736,7 +744,7 @@
           </ac:spMkLst>
         </pc:spChg>
         <pc:spChg chg="add del mod">
-          <ac:chgData name="Montecino, Diego" userId="a795c42d-832a-4dce-b1d8-09bac981a9d2" providerId="ADAL" clId="{166D12EF-58EE-6C4C-9A24-99C33C59FE65}" dt="2024-11-15T18:48:44.296" v="1114" actId="5736"/>
+          <ac:chgData name="Montecino, Diego" userId="a795c42d-832a-4dce-b1d8-09bac981a9d2" providerId="ADAL" clId="{166D12EF-58EE-6C4C-9A24-99C33C59FE65}" dt="2024-11-15T20:54:53.310" v="1137" actId="5736"/>
           <ac:spMkLst>
             <pc:docMk/>
             <pc:sldMk cId="1576011338" sldId="258"/>
@@ -744,7 +752,7 @@
           </ac:spMkLst>
         </pc:spChg>
         <pc:spChg chg="add del mod">
-          <ac:chgData name="Montecino, Diego" userId="a795c42d-832a-4dce-b1d8-09bac981a9d2" providerId="ADAL" clId="{166D12EF-58EE-6C4C-9A24-99C33C59FE65}" dt="2024-11-15T18:48:44.296" v="1114" actId="5736"/>
+          <ac:chgData name="Montecino, Diego" userId="a795c42d-832a-4dce-b1d8-09bac981a9d2" providerId="ADAL" clId="{166D12EF-58EE-6C4C-9A24-99C33C59FE65}" dt="2024-11-15T20:54:53.310" v="1137" actId="5736"/>
           <ac:spMkLst>
             <pc:docMk/>
             <pc:sldMk cId="1576011338" sldId="258"/>
@@ -752,7 +760,7 @@
           </ac:spMkLst>
         </pc:spChg>
         <pc:spChg chg="add del mod">
-          <ac:chgData name="Montecino, Diego" userId="a795c42d-832a-4dce-b1d8-09bac981a9d2" providerId="ADAL" clId="{166D12EF-58EE-6C4C-9A24-99C33C59FE65}" dt="2024-11-15T18:48:44.296" v="1114" actId="5736"/>
+          <ac:chgData name="Montecino, Diego" userId="a795c42d-832a-4dce-b1d8-09bac981a9d2" providerId="ADAL" clId="{166D12EF-58EE-6C4C-9A24-99C33C59FE65}" dt="2024-11-15T20:54:53.310" v="1137" actId="5736"/>
           <ac:spMkLst>
             <pc:docMk/>
             <pc:sldMk cId="1576011338" sldId="258"/>
@@ -760,7 +768,7 @@
           </ac:spMkLst>
         </pc:spChg>
         <pc:spChg chg="add del mod">
-          <ac:chgData name="Montecino, Diego" userId="a795c42d-832a-4dce-b1d8-09bac981a9d2" providerId="ADAL" clId="{166D12EF-58EE-6C4C-9A24-99C33C59FE65}" dt="2024-11-15T18:48:44.296" v="1114" actId="5736"/>
+          <ac:chgData name="Montecino, Diego" userId="a795c42d-832a-4dce-b1d8-09bac981a9d2" providerId="ADAL" clId="{166D12EF-58EE-6C4C-9A24-99C33C59FE65}" dt="2024-11-15T20:54:53.310" v="1137" actId="5736"/>
           <ac:spMkLst>
             <pc:docMk/>
             <pc:sldMk cId="1576011338" sldId="258"/>
@@ -768,7 +776,7 @@
           </ac:spMkLst>
         </pc:spChg>
         <pc:spChg chg="add del mod">
-          <ac:chgData name="Montecino, Diego" userId="a795c42d-832a-4dce-b1d8-09bac981a9d2" providerId="ADAL" clId="{166D12EF-58EE-6C4C-9A24-99C33C59FE65}" dt="2024-11-15T18:48:44.296" v="1114" actId="5736"/>
+          <ac:chgData name="Montecino, Diego" userId="a795c42d-832a-4dce-b1d8-09bac981a9d2" providerId="ADAL" clId="{166D12EF-58EE-6C4C-9A24-99C33C59FE65}" dt="2024-11-15T20:54:53.310" v="1137" actId="5736"/>
           <ac:spMkLst>
             <pc:docMk/>
             <pc:sldMk cId="1576011338" sldId="258"/>
@@ -784,7 +792,7 @@
           </ac:spMkLst>
         </pc:spChg>
         <pc:spChg chg="add del mod">
-          <ac:chgData name="Montecino, Diego" userId="a795c42d-832a-4dce-b1d8-09bac981a9d2" providerId="ADAL" clId="{166D12EF-58EE-6C4C-9A24-99C33C59FE65}" dt="2024-11-15T18:48:44.296" v="1114" actId="5736"/>
+          <ac:chgData name="Montecino, Diego" userId="a795c42d-832a-4dce-b1d8-09bac981a9d2" providerId="ADAL" clId="{166D12EF-58EE-6C4C-9A24-99C33C59FE65}" dt="2024-11-15T20:54:53.310" v="1137" actId="5736"/>
           <ac:spMkLst>
             <pc:docMk/>
             <pc:sldMk cId="1576011338" sldId="258"/>
@@ -792,7 +800,7 @@
           </ac:spMkLst>
         </pc:spChg>
         <pc:spChg chg="add del mod">
-          <ac:chgData name="Montecino, Diego" userId="a795c42d-832a-4dce-b1d8-09bac981a9d2" providerId="ADAL" clId="{166D12EF-58EE-6C4C-9A24-99C33C59FE65}" dt="2024-11-15T18:48:44.296" v="1114" actId="5736"/>
+          <ac:chgData name="Montecino, Diego" userId="a795c42d-832a-4dce-b1d8-09bac981a9d2" providerId="ADAL" clId="{166D12EF-58EE-6C4C-9A24-99C33C59FE65}" dt="2024-11-15T20:54:53.310" v="1137" actId="5736"/>
           <ac:spMkLst>
             <pc:docMk/>
             <pc:sldMk cId="1576011338" sldId="258"/>
@@ -800,7 +808,7 @@
           </ac:spMkLst>
         </pc:spChg>
         <pc:spChg chg="add del mod">
-          <ac:chgData name="Montecino, Diego" userId="a795c42d-832a-4dce-b1d8-09bac981a9d2" providerId="ADAL" clId="{166D12EF-58EE-6C4C-9A24-99C33C59FE65}" dt="2024-11-15T18:48:44.296" v="1114" actId="5736"/>
+          <ac:chgData name="Montecino, Diego" userId="a795c42d-832a-4dce-b1d8-09bac981a9d2" providerId="ADAL" clId="{166D12EF-58EE-6C4C-9A24-99C33C59FE65}" dt="2024-11-15T20:54:53.310" v="1137" actId="5736"/>
           <ac:spMkLst>
             <pc:docMk/>
             <pc:sldMk cId="1576011338" sldId="258"/>
@@ -808,7 +816,7 @@
           </ac:spMkLst>
         </pc:spChg>
         <pc:spChg chg="add del mod">
-          <ac:chgData name="Montecino, Diego" userId="a795c42d-832a-4dce-b1d8-09bac981a9d2" providerId="ADAL" clId="{166D12EF-58EE-6C4C-9A24-99C33C59FE65}" dt="2024-11-15T18:48:44.296" v="1114" actId="5736"/>
+          <ac:chgData name="Montecino, Diego" userId="a795c42d-832a-4dce-b1d8-09bac981a9d2" providerId="ADAL" clId="{166D12EF-58EE-6C4C-9A24-99C33C59FE65}" dt="2024-11-15T20:54:53.310" v="1137" actId="5736"/>
           <ac:spMkLst>
             <pc:docMk/>
             <pc:sldMk cId="1576011338" sldId="258"/>
@@ -816,7 +824,7 @@
           </ac:spMkLst>
         </pc:spChg>
         <pc:spChg chg="add del mod">
-          <ac:chgData name="Montecino, Diego" userId="a795c42d-832a-4dce-b1d8-09bac981a9d2" providerId="ADAL" clId="{166D12EF-58EE-6C4C-9A24-99C33C59FE65}" dt="2024-11-15T18:48:44.296" v="1114" actId="5736"/>
+          <ac:chgData name="Montecino, Diego" userId="a795c42d-832a-4dce-b1d8-09bac981a9d2" providerId="ADAL" clId="{166D12EF-58EE-6C4C-9A24-99C33C59FE65}" dt="2024-11-15T20:54:53.310" v="1137" actId="5736"/>
           <ac:spMkLst>
             <pc:docMk/>
             <pc:sldMk cId="1576011338" sldId="258"/>
@@ -824,7 +832,7 @@
           </ac:spMkLst>
         </pc:spChg>
         <pc:spChg chg="add del mod">
-          <ac:chgData name="Montecino, Diego" userId="a795c42d-832a-4dce-b1d8-09bac981a9d2" providerId="ADAL" clId="{166D12EF-58EE-6C4C-9A24-99C33C59FE65}" dt="2024-11-15T18:48:44.296" v="1114" actId="5736"/>
+          <ac:chgData name="Montecino, Diego" userId="a795c42d-832a-4dce-b1d8-09bac981a9d2" providerId="ADAL" clId="{166D12EF-58EE-6C4C-9A24-99C33C59FE65}" dt="2024-11-15T20:54:53.310" v="1137" actId="5736"/>
           <ac:spMkLst>
             <pc:docMk/>
             <pc:sldMk cId="1576011338" sldId="258"/>
@@ -832,7 +840,7 @@
           </ac:spMkLst>
         </pc:spChg>
         <pc:spChg chg="add del mod">
-          <ac:chgData name="Montecino, Diego" userId="a795c42d-832a-4dce-b1d8-09bac981a9d2" providerId="ADAL" clId="{166D12EF-58EE-6C4C-9A24-99C33C59FE65}" dt="2024-11-15T18:48:44.296" v="1114" actId="5736"/>
+          <ac:chgData name="Montecino, Diego" userId="a795c42d-832a-4dce-b1d8-09bac981a9d2" providerId="ADAL" clId="{166D12EF-58EE-6C4C-9A24-99C33C59FE65}" dt="2024-11-15T20:54:53.310" v="1137" actId="5736"/>
           <ac:spMkLst>
             <pc:docMk/>
             <pc:sldMk cId="1576011338" sldId="258"/>
@@ -840,7 +848,7 @@
           </ac:spMkLst>
         </pc:spChg>
         <pc:spChg chg="add del mod">
-          <ac:chgData name="Montecino, Diego" userId="a795c42d-832a-4dce-b1d8-09bac981a9d2" providerId="ADAL" clId="{166D12EF-58EE-6C4C-9A24-99C33C59FE65}" dt="2024-11-15T18:48:44.296" v="1114" actId="5736"/>
+          <ac:chgData name="Montecino, Diego" userId="a795c42d-832a-4dce-b1d8-09bac981a9d2" providerId="ADAL" clId="{166D12EF-58EE-6C4C-9A24-99C33C59FE65}" dt="2024-11-15T20:54:53.310" v="1137" actId="5736"/>
           <ac:spMkLst>
             <pc:docMk/>
             <pc:sldMk cId="1576011338" sldId="258"/>
@@ -848,7 +856,7 @@
           </ac:spMkLst>
         </pc:spChg>
         <pc:spChg chg="add del mod">
-          <ac:chgData name="Montecino, Diego" userId="a795c42d-832a-4dce-b1d8-09bac981a9d2" providerId="ADAL" clId="{166D12EF-58EE-6C4C-9A24-99C33C59FE65}" dt="2024-11-15T18:48:44.296" v="1114" actId="5736"/>
+          <ac:chgData name="Montecino, Diego" userId="a795c42d-832a-4dce-b1d8-09bac981a9d2" providerId="ADAL" clId="{166D12EF-58EE-6C4C-9A24-99C33C59FE65}" dt="2024-11-15T20:54:53.310" v="1137" actId="5736"/>
           <ac:spMkLst>
             <pc:docMk/>
             <pc:sldMk cId="1576011338" sldId="258"/>
@@ -856,7 +864,7 @@
           </ac:spMkLst>
         </pc:spChg>
         <pc:spChg chg="add del mod">
-          <ac:chgData name="Montecino, Diego" userId="a795c42d-832a-4dce-b1d8-09bac981a9d2" providerId="ADAL" clId="{166D12EF-58EE-6C4C-9A24-99C33C59FE65}" dt="2024-11-15T18:48:44.296" v="1114" actId="5736"/>
+          <ac:chgData name="Montecino, Diego" userId="a795c42d-832a-4dce-b1d8-09bac981a9d2" providerId="ADAL" clId="{166D12EF-58EE-6C4C-9A24-99C33C59FE65}" dt="2024-11-15T20:54:53.310" v="1137" actId="5736"/>
           <ac:spMkLst>
             <pc:docMk/>
             <pc:sldMk cId="1576011338" sldId="258"/>
@@ -864,7 +872,7 @@
           </ac:spMkLst>
         </pc:spChg>
         <pc:spChg chg="add del mod">
-          <ac:chgData name="Montecino, Diego" userId="a795c42d-832a-4dce-b1d8-09bac981a9d2" providerId="ADAL" clId="{166D12EF-58EE-6C4C-9A24-99C33C59FE65}" dt="2024-11-15T18:48:44.296" v="1114" actId="5736"/>
+          <ac:chgData name="Montecino, Diego" userId="a795c42d-832a-4dce-b1d8-09bac981a9d2" providerId="ADAL" clId="{166D12EF-58EE-6C4C-9A24-99C33C59FE65}" dt="2024-11-15T20:54:53.310" v="1137" actId="5736"/>
           <ac:spMkLst>
             <pc:docMk/>
             <pc:sldMk cId="1576011338" sldId="258"/>
@@ -880,7 +888,7 @@
           </ac:spMkLst>
         </pc:spChg>
         <pc:grpChg chg="add del mod">
-          <ac:chgData name="Montecino, Diego" userId="a795c42d-832a-4dce-b1d8-09bac981a9d2" providerId="ADAL" clId="{166D12EF-58EE-6C4C-9A24-99C33C59FE65}" dt="2024-11-15T18:48:44.296" v="1114" actId="5736"/>
+          <ac:chgData name="Montecino, Diego" userId="a795c42d-832a-4dce-b1d8-09bac981a9d2" providerId="ADAL" clId="{166D12EF-58EE-6C4C-9A24-99C33C59FE65}" dt="2024-11-15T20:54:53.310" v="1137" actId="5736"/>
           <ac:grpSpMkLst>
             <pc:docMk/>
             <pc:sldMk cId="1576011338" sldId="258"/>
@@ -888,7 +896,7 @@
           </ac:grpSpMkLst>
         </pc:grpChg>
         <pc:grpChg chg="add del mod">
-          <ac:chgData name="Montecino, Diego" userId="a795c42d-832a-4dce-b1d8-09bac981a9d2" providerId="ADAL" clId="{166D12EF-58EE-6C4C-9A24-99C33C59FE65}" dt="2024-11-15T18:48:44.296" v="1114" actId="5736"/>
+          <ac:chgData name="Montecino, Diego" userId="a795c42d-832a-4dce-b1d8-09bac981a9d2" providerId="ADAL" clId="{166D12EF-58EE-6C4C-9A24-99C33C59FE65}" dt="2024-11-15T20:54:53.310" v="1137" actId="5736"/>
           <ac:grpSpMkLst>
             <pc:docMk/>
             <pc:sldMk cId="1576011338" sldId="258"/>
@@ -896,7 +904,7 @@
           </ac:grpSpMkLst>
         </pc:grpChg>
         <pc:grpChg chg="add del mod">
-          <ac:chgData name="Montecino, Diego" userId="a795c42d-832a-4dce-b1d8-09bac981a9d2" providerId="ADAL" clId="{166D12EF-58EE-6C4C-9A24-99C33C59FE65}" dt="2024-11-15T18:48:44.296" v="1114" actId="5736"/>
+          <ac:chgData name="Montecino, Diego" userId="a795c42d-832a-4dce-b1d8-09bac981a9d2" providerId="ADAL" clId="{166D12EF-58EE-6C4C-9A24-99C33C59FE65}" dt="2024-11-15T20:54:53.310" v="1137" actId="5736"/>
           <ac:grpSpMkLst>
             <pc:docMk/>
             <pc:sldMk cId="1576011338" sldId="258"/>
@@ -904,7 +912,7 @@
           </ac:grpSpMkLst>
         </pc:grpChg>
         <pc:grpChg chg="add del mod">
-          <ac:chgData name="Montecino, Diego" userId="a795c42d-832a-4dce-b1d8-09bac981a9d2" providerId="ADAL" clId="{166D12EF-58EE-6C4C-9A24-99C33C59FE65}" dt="2024-11-15T18:48:44.296" v="1114" actId="5736"/>
+          <ac:chgData name="Montecino, Diego" userId="a795c42d-832a-4dce-b1d8-09bac981a9d2" providerId="ADAL" clId="{166D12EF-58EE-6C4C-9A24-99C33C59FE65}" dt="2024-11-15T20:54:53.310" v="1137" actId="5736"/>
           <ac:grpSpMkLst>
             <pc:docMk/>
             <pc:sldMk cId="1576011338" sldId="258"/>
@@ -912,7 +920,7 @@
           </ac:grpSpMkLst>
         </pc:grpChg>
         <pc:graphicFrameChg chg="add del mod">
-          <ac:chgData name="Montecino, Diego" userId="a795c42d-832a-4dce-b1d8-09bac981a9d2" providerId="ADAL" clId="{166D12EF-58EE-6C4C-9A24-99C33C59FE65}" dt="2024-11-15T18:48:44.296" v="1114" actId="5736"/>
+          <ac:chgData name="Montecino, Diego" userId="a795c42d-832a-4dce-b1d8-09bac981a9d2" providerId="ADAL" clId="{166D12EF-58EE-6C4C-9A24-99C33C59FE65}" dt="2024-11-15T20:54:53.310" v="1137" actId="5736"/>
           <ac:graphicFrameMkLst>
             <pc:docMk/>
             <pc:sldMk cId="1576011338" sldId="258"/>
@@ -920,7 +928,7 @@
           </ac:graphicFrameMkLst>
         </pc:graphicFrameChg>
         <pc:cxnChg chg="add mod">
-          <ac:chgData name="Montecino, Diego" userId="a795c42d-832a-4dce-b1d8-09bac981a9d2" providerId="ADAL" clId="{166D12EF-58EE-6C4C-9A24-99C33C59FE65}" dt="2024-11-15T18:48:44.296" v="1114" actId="5736"/>
+          <ac:chgData name="Montecino, Diego" userId="a795c42d-832a-4dce-b1d8-09bac981a9d2" providerId="ADAL" clId="{166D12EF-58EE-6C4C-9A24-99C33C59FE65}" dt="2024-11-15T20:54:53.310" v="1137" actId="5736"/>
           <ac:cxnSpMkLst>
             <pc:docMk/>
             <pc:sldMk cId="1576011338" sldId="258"/>
@@ -928,7 +936,7 @@
           </ac:cxnSpMkLst>
         </pc:cxnChg>
         <pc:cxnChg chg="add mod">
-          <ac:chgData name="Montecino, Diego" userId="a795c42d-832a-4dce-b1d8-09bac981a9d2" providerId="ADAL" clId="{166D12EF-58EE-6C4C-9A24-99C33C59FE65}" dt="2024-11-15T18:48:44.296" v="1114" actId="5736"/>
+          <ac:chgData name="Montecino, Diego" userId="a795c42d-832a-4dce-b1d8-09bac981a9d2" providerId="ADAL" clId="{166D12EF-58EE-6C4C-9A24-99C33C59FE65}" dt="2024-11-15T20:54:53.310" v="1137" actId="5736"/>
           <ac:cxnSpMkLst>
             <pc:docMk/>
             <pc:sldMk cId="1576011338" sldId="258"/>
@@ -936,7 +944,7 @@
           </ac:cxnSpMkLst>
         </pc:cxnChg>
         <pc:cxnChg chg="add mod">
-          <ac:chgData name="Montecino, Diego" userId="a795c42d-832a-4dce-b1d8-09bac981a9d2" providerId="ADAL" clId="{166D12EF-58EE-6C4C-9A24-99C33C59FE65}" dt="2024-11-15T18:48:44.296" v="1114" actId="5736"/>
+          <ac:chgData name="Montecino, Diego" userId="a795c42d-832a-4dce-b1d8-09bac981a9d2" providerId="ADAL" clId="{166D12EF-58EE-6C4C-9A24-99C33C59FE65}" dt="2024-11-15T20:54:53.310" v="1137" actId="5736"/>
           <ac:cxnSpMkLst>
             <pc:docMk/>
             <pc:sldMk cId="1576011338" sldId="258"/>
@@ -952,7 +960,7 @@
           </ac:cxnSpMkLst>
         </pc:cxnChg>
         <pc:cxnChg chg="add del mod">
-          <ac:chgData name="Montecino, Diego" userId="a795c42d-832a-4dce-b1d8-09bac981a9d2" providerId="ADAL" clId="{166D12EF-58EE-6C4C-9A24-99C33C59FE65}" dt="2024-11-15T18:48:44.296" v="1114" actId="5736"/>
+          <ac:chgData name="Montecino, Diego" userId="a795c42d-832a-4dce-b1d8-09bac981a9d2" providerId="ADAL" clId="{166D12EF-58EE-6C4C-9A24-99C33C59FE65}" dt="2024-11-15T20:54:53.310" v="1137" actId="5736"/>
           <ac:cxnSpMkLst>
             <pc:docMk/>
             <pc:sldMk cId="1576011338" sldId="258"/>
@@ -960,7 +968,7 @@
           </ac:cxnSpMkLst>
         </pc:cxnChg>
         <pc:cxnChg chg="add mod">
-          <ac:chgData name="Montecino, Diego" userId="a795c42d-832a-4dce-b1d8-09bac981a9d2" providerId="ADAL" clId="{166D12EF-58EE-6C4C-9A24-99C33C59FE65}" dt="2024-11-15T18:48:44.296" v="1114" actId="5736"/>
+          <ac:chgData name="Montecino, Diego" userId="a795c42d-832a-4dce-b1d8-09bac981a9d2" providerId="ADAL" clId="{166D12EF-58EE-6C4C-9A24-99C33C59FE65}" dt="2024-11-15T20:54:53.310" v="1137" actId="5736"/>
           <ac:cxnSpMkLst>
             <pc:docMk/>
             <pc:sldMk cId="1576011338" sldId="258"/>
@@ -976,7 +984,7 @@
           </ac:cxnSpMkLst>
         </pc:cxnChg>
         <pc:cxnChg chg="add del mod">
-          <ac:chgData name="Montecino, Diego" userId="a795c42d-832a-4dce-b1d8-09bac981a9d2" providerId="ADAL" clId="{166D12EF-58EE-6C4C-9A24-99C33C59FE65}" dt="2024-11-15T18:48:44.296" v="1114" actId="5736"/>
+          <ac:chgData name="Montecino, Diego" userId="a795c42d-832a-4dce-b1d8-09bac981a9d2" providerId="ADAL" clId="{166D12EF-58EE-6C4C-9A24-99C33C59FE65}" dt="2024-11-15T20:54:53.310" v="1137" actId="5736"/>
           <ac:cxnSpMkLst>
             <pc:docMk/>
             <pc:sldMk cId="1576011338" sldId="258"/>
@@ -984,7 +992,7 @@
           </ac:cxnSpMkLst>
         </pc:cxnChg>
         <pc:cxnChg chg="add del mod">
-          <ac:chgData name="Montecino, Diego" userId="a795c42d-832a-4dce-b1d8-09bac981a9d2" providerId="ADAL" clId="{166D12EF-58EE-6C4C-9A24-99C33C59FE65}" dt="2024-11-15T18:48:44.296" v="1114" actId="5736"/>
+          <ac:chgData name="Montecino, Diego" userId="a795c42d-832a-4dce-b1d8-09bac981a9d2" providerId="ADAL" clId="{166D12EF-58EE-6C4C-9A24-99C33C59FE65}" dt="2024-11-15T20:54:53.310" v="1137" actId="5736"/>
           <ac:cxnSpMkLst>
             <pc:docMk/>
             <pc:sldMk cId="1576011338" sldId="258"/>
@@ -992,7 +1000,7 @@
           </ac:cxnSpMkLst>
         </pc:cxnChg>
         <pc:cxnChg chg="add del mod">
-          <ac:chgData name="Montecino, Diego" userId="a795c42d-832a-4dce-b1d8-09bac981a9d2" providerId="ADAL" clId="{166D12EF-58EE-6C4C-9A24-99C33C59FE65}" dt="2024-11-15T18:48:44.296" v="1114" actId="5736"/>
+          <ac:chgData name="Montecino, Diego" userId="a795c42d-832a-4dce-b1d8-09bac981a9d2" providerId="ADAL" clId="{166D12EF-58EE-6C4C-9A24-99C33C59FE65}" dt="2024-11-15T20:54:53.310" v="1137" actId="5736"/>
           <ac:cxnSpMkLst>
             <pc:docMk/>
             <pc:sldMk cId="1576011338" sldId="258"/>
@@ -1008,7 +1016,7 @@
           </ac:cxnSpMkLst>
         </pc:cxnChg>
         <pc:cxnChg chg="add mod">
-          <ac:chgData name="Montecino, Diego" userId="a795c42d-832a-4dce-b1d8-09bac981a9d2" providerId="ADAL" clId="{166D12EF-58EE-6C4C-9A24-99C33C59FE65}" dt="2024-11-15T18:48:44.296" v="1114" actId="5736"/>
+          <ac:chgData name="Montecino, Diego" userId="a795c42d-832a-4dce-b1d8-09bac981a9d2" providerId="ADAL" clId="{166D12EF-58EE-6C4C-9A24-99C33C59FE65}" dt="2024-11-15T20:54:53.310" v="1137" actId="5736"/>
           <ac:cxnSpMkLst>
             <pc:docMk/>
             <pc:sldMk cId="1576011338" sldId="258"/>
@@ -1016,7 +1024,7 @@
           </ac:cxnSpMkLst>
         </pc:cxnChg>
         <pc:cxnChg chg="add mod">
-          <ac:chgData name="Montecino, Diego" userId="a795c42d-832a-4dce-b1d8-09bac981a9d2" providerId="ADAL" clId="{166D12EF-58EE-6C4C-9A24-99C33C59FE65}" dt="2024-11-15T18:48:44.296" v="1114" actId="5736"/>
+          <ac:chgData name="Montecino, Diego" userId="a795c42d-832a-4dce-b1d8-09bac981a9d2" providerId="ADAL" clId="{166D12EF-58EE-6C4C-9A24-99C33C59FE65}" dt="2024-11-15T20:54:53.310" v="1137" actId="5736"/>
           <ac:cxnSpMkLst>
             <pc:docMk/>
             <pc:sldMk cId="1576011338" sldId="258"/>
@@ -1024,7 +1032,7 @@
           </ac:cxnSpMkLst>
         </pc:cxnChg>
         <pc:cxnChg chg="add mod">
-          <ac:chgData name="Montecino, Diego" userId="a795c42d-832a-4dce-b1d8-09bac981a9d2" providerId="ADAL" clId="{166D12EF-58EE-6C4C-9A24-99C33C59FE65}" dt="2024-11-15T18:48:44.296" v="1114" actId="5736"/>
+          <ac:chgData name="Montecino, Diego" userId="a795c42d-832a-4dce-b1d8-09bac981a9d2" providerId="ADAL" clId="{166D12EF-58EE-6C4C-9A24-99C33C59FE65}" dt="2024-11-15T20:54:53.310" v="1137" actId="5736"/>
           <ac:cxnSpMkLst>
             <pc:docMk/>
             <pc:sldMk cId="1576011338" sldId="258"/>
@@ -1032,7 +1040,7 @@
           </ac:cxnSpMkLst>
         </pc:cxnChg>
         <pc:cxnChg chg="add del mod">
-          <ac:chgData name="Montecino, Diego" userId="a795c42d-832a-4dce-b1d8-09bac981a9d2" providerId="ADAL" clId="{166D12EF-58EE-6C4C-9A24-99C33C59FE65}" dt="2024-11-15T18:48:44.296" v="1114" actId="5736"/>
+          <ac:chgData name="Montecino, Diego" userId="a795c42d-832a-4dce-b1d8-09bac981a9d2" providerId="ADAL" clId="{166D12EF-58EE-6C4C-9A24-99C33C59FE65}" dt="2024-11-15T20:54:53.310" v="1137" actId="5736"/>
           <ac:cxnSpMkLst>
             <pc:docMk/>
             <pc:sldMk cId="1576011338" sldId="258"/>
@@ -1040,7 +1048,7 @@
           </ac:cxnSpMkLst>
         </pc:cxnChg>
         <pc:cxnChg chg="add del mod">
-          <ac:chgData name="Montecino, Diego" userId="a795c42d-832a-4dce-b1d8-09bac981a9d2" providerId="ADAL" clId="{166D12EF-58EE-6C4C-9A24-99C33C59FE65}" dt="2024-11-15T18:48:44.296" v="1114" actId="5736"/>
+          <ac:chgData name="Montecino, Diego" userId="a795c42d-832a-4dce-b1d8-09bac981a9d2" providerId="ADAL" clId="{166D12EF-58EE-6C4C-9A24-99C33C59FE65}" dt="2024-11-15T20:54:53.310" v="1137" actId="5736"/>
           <ac:cxnSpMkLst>
             <pc:docMk/>
             <pc:sldMk cId="1576011338" sldId="258"/>
@@ -1048,7 +1056,7 @@
           </ac:cxnSpMkLst>
         </pc:cxnChg>
         <pc:cxnChg chg="add del mod">
-          <ac:chgData name="Montecino, Diego" userId="a795c42d-832a-4dce-b1d8-09bac981a9d2" providerId="ADAL" clId="{166D12EF-58EE-6C4C-9A24-99C33C59FE65}" dt="2024-11-15T18:48:44.296" v="1114" actId="5736"/>
+          <ac:chgData name="Montecino, Diego" userId="a795c42d-832a-4dce-b1d8-09bac981a9d2" providerId="ADAL" clId="{166D12EF-58EE-6C4C-9A24-99C33C59FE65}" dt="2024-11-15T20:54:53.310" v="1137" actId="5736"/>
           <ac:cxnSpMkLst>
             <pc:docMk/>
             <pc:sldMk cId="1576011338" sldId="258"/>
@@ -1056,7 +1064,7 @@
           </ac:cxnSpMkLst>
         </pc:cxnChg>
         <pc:cxnChg chg="add mod">
-          <ac:chgData name="Montecino, Diego" userId="a795c42d-832a-4dce-b1d8-09bac981a9d2" providerId="ADAL" clId="{166D12EF-58EE-6C4C-9A24-99C33C59FE65}" dt="2024-11-15T18:48:44.296" v="1114" actId="5736"/>
+          <ac:chgData name="Montecino, Diego" userId="a795c42d-832a-4dce-b1d8-09bac981a9d2" providerId="ADAL" clId="{166D12EF-58EE-6C4C-9A24-99C33C59FE65}" dt="2024-11-15T20:54:53.310" v="1137" actId="5736"/>
           <ac:cxnSpMkLst>
             <pc:docMk/>
             <pc:sldMk cId="1576011338" sldId="258"/>
@@ -1064,7 +1072,7 @@
           </ac:cxnSpMkLst>
         </pc:cxnChg>
         <pc:cxnChg chg="add del mod">
-          <ac:chgData name="Montecino, Diego" userId="a795c42d-832a-4dce-b1d8-09bac981a9d2" providerId="ADAL" clId="{166D12EF-58EE-6C4C-9A24-99C33C59FE65}" dt="2024-11-15T18:48:44.296" v="1114" actId="5736"/>
+          <ac:chgData name="Montecino, Diego" userId="a795c42d-832a-4dce-b1d8-09bac981a9d2" providerId="ADAL" clId="{166D12EF-58EE-6C4C-9A24-99C33C59FE65}" dt="2024-11-15T20:54:53.310" v="1137" actId="5736"/>
           <ac:cxnSpMkLst>
             <pc:docMk/>
             <pc:sldMk cId="1576011338" sldId="258"/>
@@ -1072,7 +1080,7 @@
           </ac:cxnSpMkLst>
         </pc:cxnChg>
         <pc:cxnChg chg="add del mod">
-          <ac:chgData name="Montecino, Diego" userId="a795c42d-832a-4dce-b1d8-09bac981a9d2" providerId="ADAL" clId="{166D12EF-58EE-6C4C-9A24-99C33C59FE65}" dt="2024-11-15T18:48:44.296" v="1114" actId="5736"/>
+          <ac:chgData name="Montecino, Diego" userId="a795c42d-832a-4dce-b1d8-09bac981a9d2" providerId="ADAL" clId="{166D12EF-58EE-6C4C-9A24-99C33C59FE65}" dt="2024-11-15T20:54:53.310" v="1137" actId="5736"/>
           <ac:cxnSpMkLst>
             <pc:docMk/>
             <pc:sldMk cId="1576011338" sldId="258"/>
@@ -1080,7 +1088,7 @@
           </ac:cxnSpMkLst>
         </pc:cxnChg>
         <pc:cxnChg chg="add del mod">
-          <ac:chgData name="Montecino, Diego" userId="a795c42d-832a-4dce-b1d8-09bac981a9d2" providerId="ADAL" clId="{166D12EF-58EE-6C4C-9A24-99C33C59FE65}" dt="2024-11-15T18:48:44.296" v="1114" actId="5736"/>
+          <ac:chgData name="Montecino, Diego" userId="a795c42d-832a-4dce-b1d8-09bac981a9d2" providerId="ADAL" clId="{166D12EF-58EE-6C4C-9A24-99C33C59FE65}" dt="2024-11-15T20:54:53.310" v="1137" actId="5736"/>
           <ac:cxnSpMkLst>
             <pc:docMk/>
             <pc:sldMk cId="1576011338" sldId="258"/>
@@ -1096,7 +1104,7 @@
           </ac:cxnSpMkLst>
         </pc:cxnChg>
         <pc:cxnChg chg="add del mod">
-          <ac:chgData name="Montecino, Diego" userId="a795c42d-832a-4dce-b1d8-09bac981a9d2" providerId="ADAL" clId="{166D12EF-58EE-6C4C-9A24-99C33C59FE65}" dt="2024-11-15T18:48:44.296" v="1114" actId="5736"/>
+          <ac:chgData name="Montecino, Diego" userId="a795c42d-832a-4dce-b1d8-09bac981a9d2" providerId="ADAL" clId="{166D12EF-58EE-6C4C-9A24-99C33C59FE65}" dt="2024-11-15T20:54:53.310" v="1137" actId="5736"/>
           <ac:cxnSpMkLst>
             <pc:docMk/>
             <pc:sldMk cId="1576011338" sldId="258"/>
@@ -1104,7 +1112,7 @@
           </ac:cxnSpMkLst>
         </pc:cxnChg>
         <pc:cxnChg chg="add del mod">
-          <ac:chgData name="Montecino, Diego" userId="a795c42d-832a-4dce-b1d8-09bac981a9d2" providerId="ADAL" clId="{166D12EF-58EE-6C4C-9A24-99C33C59FE65}" dt="2024-11-15T18:48:44.296" v="1114" actId="5736"/>
+          <ac:chgData name="Montecino, Diego" userId="a795c42d-832a-4dce-b1d8-09bac981a9d2" providerId="ADAL" clId="{166D12EF-58EE-6C4C-9A24-99C33C59FE65}" dt="2024-11-15T20:54:53.310" v="1137" actId="5736"/>
           <ac:cxnSpMkLst>
             <pc:docMk/>
             <pc:sldMk cId="1576011338" sldId="258"/>
@@ -1112,7 +1120,7 @@
           </ac:cxnSpMkLst>
         </pc:cxnChg>
         <pc:cxnChg chg="add del mod">
-          <ac:chgData name="Montecino, Diego" userId="a795c42d-832a-4dce-b1d8-09bac981a9d2" providerId="ADAL" clId="{166D12EF-58EE-6C4C-9A24-99C33C59FE65}" dt="2024-11-15T18:48:44.296" v="1114" actId="5736"/>
+          <ac:chgData name="Montecino, Diego" userId="a795c42d-832a-4dce-b1d8-09bac981a9d2" providerId="ADAL" clId="{166D12EF-58EE-6C4C-9A24-99C33C59FE65}" dt="2024-11-15T20:54:53.310" v="1137" actId="5736"/>
           <ac:cxnSpMkLst>
             <pc:docMk/>
             <pc:sldMk cId="1576011338" sldId="258"/>
@@ -1120,7 +1128,7 @@
           </ac:cxnSpMkLst>
         </pc:cxnChg>
         <pc:cxnChg chg="add del mod">
-          <ac:chgData name="Montecino, Diego" userId="a795c42d-832a-4dce-b1d8-09bac981a9d2" providerId="ADAL" clId="{166D12EF-58EE-6C4C-9A24-99C33C59FE65}" dt="2024-11-15T18:48:44.296" v="1114" actId="5736"/>
+          <ac:chgData name="Montecino, Diego" userId="a795c42d-832a-4dce-b1d8-09bac981a9d2" providerId="ADAL" clId="{166D12EF-58EE-6C4C-9A24-99C33C59FE65}" dt="2024-11-15T20:54:53.310" v="1137" actId="5736"/>
           <ac:cxnSpMkLst>
             <pc:docMk/>
             <pc:sldMk cId="1576011338" sldId="258"/>
@@ -1152,15 +1160,23 @@
           </ac:cxnSpMkLst>
         </pc:cxnChg>
         <pc:cxnChg chg="add del mod">
-          <ac:chgData name="Montecino, Diego" userId="a795c42d-832a-4dce-b1d8-09bac981a9d2" providerId="ADAL" clId="{166D12EF-58EE-6C4C-9A24-99C33C59FE65}" dt="2024-11-15T18:48:44.296" v="1114" actId="5736"/>
+          <ac:chgData name="Montecino, Diego" userId="a795c42d-832a-4dce-b1d8-09bac981a9d2" providerId="ADAL" clId="{166D12EF-58EE-6C4C-9A24-99C33C59FE65}" dt="2024-11-15T20:54:53.310" v="1137" actId="5736"/>
           <ac:cxnSpMkLst>
             <pc:docMk/>
             <pc:sldMk cId="1576011338" sldId="258"/>
             <ac:cxnSpMk id="54" creationId="{1436B52B-AFE3-8116-E788-BDF874E6294A}"/>
           </ac:cxnSpMkLst>
         </pc:cxnChg>
+        <pc:cxnChg chg="add mod">
+          <ac:chgData name="Montecino, Diego" userId="a795c42d-832a-4dce-b1d8-09bac981a9d2" providerId="ADAL" clId="{166D12EF-58EE-6C4C-9A24-99C33C59FE65}" dt="2024-11-15T20:51:48.009" v="1120" actId="1076"/>
+          <ac:cxnSpMkLst>
+            <pc:docMk/>
+            <pc:sldMk cId="1576011338" sldId="258"/>
+            <ac:cxnSpMk id="55" creationId="{495A05C6-AD02-A7E7-99A0-15CEDCE1DB93}"/>
+          </ac:cxnSpMkLst>
+        </pc:cxnChg>
         <pc:cxnChg chg="add del mod">
-          <ac:chgData name="Montecino, Diego" userId="a795c42d-832a-4dce-b1d8-09bac981a9d2" providerId="ADAL" clId="{166D12EF-58EE-6C4C-9A24-99C33C59FE65}" dt="2024-11-15T18:48:44.296" v="1114" actId="5736"/>
+          <ac:chgData name="Montecino, Diego" userId="a795c42d-832a-4dce-b1d8-09bac981a9d2" providerId="ADAL" clId="{166D12EF-58EE-6C4C-9A24-99C33C59FE65}" dt="2024-11-15T20:54:53.310" v="1137" actId="5736"/>
           <ac:cxnSpMkLst>
             <pc:docMk/>
             <pc:sldMk cId="1576011338" sldId="258"/>
@@ -1168,7 +1184,7 @@
           </ac:cxnSpMkLst>
         </pc:cxnChg>
         <pc:cxnChg chg="add del mod">
-          <ac:chgData name="Montecino, Diego" userId="a795c42d-832a-4dce-b1d8-09bac981a9d2" providerId="ADAL" clId="{166D12EF-58EE-6C4C-9A24-99C33C59FE65}" dt="2024-11-15T18:48:44.296" v="1114" actId="5736"/>
+          <ac:chgData name="Montecino, Diego" userId="a795c42d-832a-4dce-b1d8-09bac981a9d2" providerId="ADAL" clId="{166D12EF-58EE-6C4C-9A24-99C33C59FE65}" dt="2024-11-15T20:54:53.310" v="1137" actId="5736"/>
           <ac:cxnSpMkLst>
             <pc:docMk/>
             <pc:sldMk cId="1576011338" sldId="258"/>
@@ -1176,7 +1192,7 @@
           </ac:cxnSpMkLst>
         </pc:cxnChg>
         <pc:cxnChg chg="add del mod">
-          <ac:chgData name="Montecino, Diego" userId="a795c42d-832a-4dce-b1d8-09bac981a9d2" providerId="ADAL" clId="{166D12EF-58EE-6C4C-9A24-99C33C59FE65}" dt="2024-11-15T18:48:44.296" v="1114" actId="5736"/>
+          <ac:chgData name="Montecino, Diego" userId="a795c42d-832a-4dce-b1d8-09bac981a9d2" providerId="ADAL" clId="{166D12EF-58EE-6C4C-9A24-99C33C59FE65}" dt="2024-11-15T20:54:53.310" v="1137" actId="5736"/>
           <ac:cxnSpMkLst>
             <pc:docMk/>
             <pc:sldMk cId="1576011338" sldId="258"/>
@@ -1184,15 +1200,23 @@
           </ac:cxnSpMkLst>
         </pc:cxnChg>
         <pc:cxnChg chg="add del mod">
-          <ac:chgData name="Montecino, Diego" userId="a795c42d-832a-4dce-b1d8-09bac981a9d2" providerId="ADAL" clId="{166D12EF-58EE-6C4C-9A24-99C33C59FE65}" dt="2024-11-15T18:48:44.296" v="1114" actId="5736"/>
+          <ac:chgData name="Montecino, Diego" userId="a795c42d-832a-4dce-b1d8-09bac981a9d2" providerId="ADAL" clId="{166D12EF-58EE-6C4C-9A24-99C33C59FE65}" dt="2024-11-15T20:54:53.310" v="1137" actId="5736"/>
           <ac:cxnSpMkLst>
             <pc:docMk/>
             <pc:sldMk cId="1576011338" sldId="258"/>
             <ac:cxnSpMk id="59" creationId="{410F3A40-1D16-8978-0FA1-66483A247EA3}"/>
           </ac:cxnSpMkLst>
         </pc:cxnChg>
+        <pc:cxnChg chg="add mod">
+          <ac:chgData name="Montecino, Diego" userId="a795c42d-832a-4dce-b1d8-09bac981a9d2" providerId="ADAL" clId="{166D12EF-58EE-6C4C-9A24-99C33C59FE65}" dt="2024-11-15T20:54:53.310" v="1137" actId="5736"/>
+          <ac:cxnSpMkLst>
+            <pc:docMk/>
+            <pc:sldMk cId="1576011338" sldId="258"/>
+            <ac:cxnSpMk id="60" creationId="{835A9BCB-7D48-3524-EEFF-32DB9B802ABC}"/>
+          </ac:cxnSpMkLst>
+        </pc:cxnChg>
         <pc:cxnChg chg="add del mod">
-          <ac:chgData name="Montecino, Diego" userId="a795c42d-832a-4dce-b1d8-09bac981a9d2" providerId="ADAL" clId="{166D12EF-58EE-6C4C-9A24-99C33C59FE65}" dt="2024-11-15T18:48:44.296" v="1114" actId="5736"/>
+          <ac:chgData name="Montecino, Diego" userId="a795c42d-832a-4dce-b1d8-09bac981a9d2" providerId="ADAL" clId="{166D12EF-58EE-6C4C-9A24-99C33C59FE65}" dt="2024-11-15T20:54:53.310" v="1137" actId="5736"/>
           <ac:cxnSpMkLst>
             <pc:docMk/>
             <pc:sldMk cId="1576011338" sldId="258"/>
@@ -1200,7 +1224,7 @@
           </ac:cxnSpMkLst>
         </pc:cxnChg>
         <pc:cxnChg chg="add del mod">
-          <ac:chgData name="Montecino, Diego" userId="a795c42d-832a-4dce-b1d8-09bac981a9d2" providerId="ADAL" clId="{166D12EF-58EE-6C4C-9A24-99C33C59FE65}" dt="2024-11-15T18:48:44.296" v="1114" actId="5736"/>
+          <ac:chgData name="Montecino, Diego" userId="a795c42d-832a-4dce-b1d8-09bac981a9d2" providerId="ADAL" clId="{166D12EF-58EE-6C4C-9A24-99C33C59FE65}" dt="2024-11-15T20:54:53.310" v="1137" actId="5736"/>
           <ac:cxnSpMkLst>
             <pc:docMk/>
             <pc:sldMk cId="1576011338" sldId="258"/>
@@ -1208,7 +1232,7 @@
           </ac:cxnSpMkLst>
         </pc:cxnChg>
         <pc:cxnChg chg="add del mod">
-          <ac:chgData name="Montecino, Diego" userId="a795c42d-832a-4dce-b1d8-09bac981a9d2" providerId="ADAL" clId="{166D12EF-58EE-6C4C-9A24-99C33C59FE65}" dt="2024-11-15T18:48:44.296" v="1114" actId="5736"/>
+          <ac:chgData name="Montecino, Diego" userId="a795c42d-832a-4dce-b1d8-09bac981a9d2" providerId="ADAL" clId="{166D12EF-58EE-6C4C-9A24-99C33C59FE65}" dt="2024-11-15T20:54:53.310" v="1137" actId="5736"/>
           <ac:cxnSpMkLst>
             <pc:docMk/>
             <pc:sldMk cId="1576011338" sldId="258"/>
@@ -1216,7 +1240,7 @@
           </ac:cxnSpMkLst>
         </pc:cxnChg>
         <pc:cxnChg chg="add del mod">
-          <ac:chgData name="Montecino, Diego" userId="a795c42d-832a-4dce-b1d8-09bac981a9d2" providerId="ADAL" clId="{166D12EF-58EE-6C4C-9A24-99C33C59FE65}" dt="2024-11-15T18:48:44.296" v="1114" actId="5736"/>
+          <ac:chgData name="Montecino, Diego" userId="a795c42d-832a-4dce-b1d8-09bac981a9d2" providerId="ADAL" clId="{166D12EF-58EE-6C4C-9A24-99C33C59FE65}" dt="2024-11-15T20:54:53.310" v="1137" actId="5736"/>
           <ac:cxnSpMkLst>
             <pc:docMk/>
             <pc:sldMk cId="1576011338" sldId="258"/>
@@ -1224,7 +1248,7 @@
           </ac:cxnSpMkLst>
         </pc:cxnChg>
         <pc:cxnChg chg="add del mod">
-          <ac:chgData name="Montecino, Diego" userId="a795c42d-832a-4dce-b1d8-09bac981a9d2" providerId="ADAL" clId="{166D12EF-58EE-6C4C-9A24-99C33C59FE65}" dt="2024-11-15T18:48:44.296" v="1114" actId="5736"/>
+          <ac:chgData name="Montecino, Diego" userId="a795c42d-832a-4dce-b1d8-09bac981a9d2" providerId="ADAL" clId="{166D12EF-58EE-6C4C-9A24-99C33C59FE65}" dt="2024-11-15T20:54:53.310" v="1137" actId="5736"/>
           <ac:cxnSpMkLst>
             <pc:docMk/>
             <pc:sldMk cId="1576011338" sldId="258"/>
@@ -1232,7 +1256,7 @@
           </ac:cxnSpMkLst>
         </pc:cxnChg>
         <pc:cxnChg chg="add del mod">
-          <ac:chgData name="Montecino, Diego" userId="a795c42d-832a-4dce-b1d8-09bac981a9d2" providerId="ADAL" clId="{166D12EF-58EE-6C4C-9A24-99C33C59FE65}" dt="2024-11-15T18:48:44.296" v="1114" actId="5736"/>
+          <ac:chgData name="Montecino, Diego" userId="a795c42d-832a-4dce-b1d8-09bac981a9d2" providerId="ADAL" clId="{166D12EF-58EE-6C4C-9A24-99C33C59FE65}" dt="2024-11-15T20:54:53.310" v="1137" actId="5736"/>
           <ac:cxnSpMkLst>
             <pc:docMk/>
             <pc:sldMk cId="1576011338" sldId="258"/>
@@ -1240,7 +1264,7 @@
           </ac:cxnSpMkLst>
         </pc:cxnChg>
         <pc:cxnChg chg="add del mod">
-          <ac:chgData name="Montecino, Diego" userId="a795c42d-832a-4dce-b1d8-09bac981a9d2" providerId="ADAL" clId="{166D12EF-58EE-6C4C-9A24-99C33C59FE65}" dt="2024-11-15T18:48:44.296" v="1114" actId="5736"/>
+          <ac:chgData name="Montecino, Diego" userId="a795c42d-832a-4dce-b1d8-09bac981a9d2" providerId="ADAL" clId="{166D12EF-58EE-6C4C-9A24-99C33C59FE65}" dt="2024-11-15T20:54:53.310" v="1137" actId="5736"/>
           <ac:cxnSpMkLst>
             <pc:docMk/>
             <pc:sldMk cId="1576011338" sldId="258"/>
@@ -1248,7 +1272,7 @@
           </ac:cxnSpMkLst>
         </pc:cxnChg>
         <pc:cxnChg chg="add del mod">
-          <ac:chgData name="Montecino, Diego" userId="a795c42d-832a-4dce-b1d8-09bac981a9d2" providerId="ADAL" clId="{166D12EF-58EE-6C4C-9A24-99C33C59FE65}" dt="2024-11-15T18:48:44.296" v="1114" actId="5736"/>
+          <ac:chgData name="Montecino, Diego" userId="a795c42d-832a-4dce-b1d8-09bac981a9d2" providerId="ADAL" clId="{166D12EF-58EE-6C4C-9A24-99C33C59FE65}" dt="2024-11-15T20:54:53.310" v="1137" actId="5736"/>
           <ac:cxnSpMkLst>
             <pc:docMk/>
             <pc:sldMk cId="1576011338" sldId="258"/>
@@ -1256,7 +1280,7 @@
           </ac:cxnSpMkLst>
         </pc:cxnChg>
         <pc:cxnChg chg="add del mod">
-          <ac:chgData name="Montecino, Diego" userId="a795c42d-832a-4dce-b1d8-09bac981a9d2" providerId="ADAL" clId="{166D12EF-58EE-6C4C-9A24-99C33C59FE65}" dt="2024-11-15T18:48:44.296" v="1114" actId="5736"/>
+          <ac:chgData name="Montecino, Diego" userId="a795c42d-832a-4dce-b1d8-09bac981a9d2" providerId="ADAL" clId="{166D12EF-58EE-6C4C-9A24-99C33C59FE65}" dt="2024-11-15T20:54:53.310" v="1137" actId="5736"/>
           <ac:cxnSpMkLst>
             <pc:docMk/>
             <pc:sldMk cId="1576011338" sldId="258"/>
@@ -1304,7 +1328,7 @@
         </pc:spChg>
       </pc:sldChg>
       <pc:sldChg chg="addSp delSp modSp add mod">
-        <pc:chgData name="Montecino, Diego" userId="a795c42d-832a-4dce-b1d8-09bac981a9d2" providerId="ADAL" clId="{166D12EF-58EE-6C4C-9A24-99C33C59FE65}" dt="2024-11-15T18:42:55.522" v="1113" actId="5736"/>
+        <pc:chgData name="Montecino, Diego" userId="a795c42d-832a-4dce-b1d8-09bac981a9d2" providerId="ADAL" clId="{166D12EF-58EE-6C4C-9A24-99C33C59FE65}" dt="2024-11-15T20:54:24.153" v="1135" actId="5736"/>
         <pc:sldMkLst>
           <pc:docMk/>
           <pc:sldMk cId="2695032720" sldId="259"/>
@@ -1318,7 +1342,7 @@
           </ac:spMkLst>
         </pc:spChg>
         <pc:spChg chg="add mod">
-          <ac:chgData name="Montecino, Diego" userId="a795c42d-832a-4dce-b1d8-09bac981a9d2" providerId="ADAL" clId="{166D12EF-58EE-6C4C-9A24-99C33C59FE65}" dt="2024-11-15T18:42:55.522" v="1113" actId="5736"/>
+          <ac:chgData name="Montecino, Diego" userId="a795c42d-832a-4dce-b1d8-09bac981a9d2" providerId="ADAL" clId="{166D12EF-58EE-6C4C-9A24-99C33C59FE65}" dt="2024-11-15T20:54:24.153" v="1135" actId="5736"/>
           <ac:spMkLst>
             <pc:docMk/>
             <pc:sldMk cId="2695032720" sldId="259"/>
@@ -1326,7 +1350,7 @@
           </ac:spMkLst>
         </pc:spChg>
         <pc:spChg chg="add mod">
-          <ac:chgData name="Montecino, Diego" userId="a795c42d-832a-4dce-b1d8-09bac981a9d2" providerId="ADAL" clId="{166D12EF-58EE-6C4C-9A24-99C33C59FE65}" dt="2024-11-15T18:42:55.522" v="1113" actId="5736"/>
+          <ac:chgData name="Montecino, Diego" userId="a795c42d-832a-4dce-b1d8-09bac981a9d2" providerId="ADAL" clId="{166D12EF-58EE-6C4C-9A24-99C33C59FE65}" dt="2024-11-15T20:54:24.153" v="1135" actId="5736"/>
           <ac:spMkLst>
             <pc:docMk/>
             <pc:sldMk cId="2695032720" sldId="259"/>
@@ -1334,7 +1358,7 @@
           </ac:spMkLst>
         </pc:spChg>
         <pc:spChg chg="add mod">
-          <ac:chgData name="Montecino, Diego" userId="a795c42d-832a-4dce-b1d8-09bac981a9d2" providerId="ADAL" clId="{166D12EF-58EE-6C4C-9A24-99C33C59FE65}" dt="2024-11-15T18:42:55.522" v="1113" actId="5736"/>
+          <ac:chgData name="Montecino, Diego" userId="a795c42d-832a-4dce-b1d8-09bac981a9d2" providerId="ADAL" clId="{166D12EF-58EE-6C4C-9A24-99C33C59FE65}" dt="2024-11-15T20:54:24.153" v="1135" actId="5736"/>
           <ac:spMkLst>
             <pc:docMk/>
             <pc:sldMk cId="2695032720" sldId="259"/>
@@ -1342,7 +1366,7 @@
           </ac:spMkLst>
         </pc:spChg>
         <pc:spChg chg="add mod">
-          <ac:chgData name="Montecino, Diego" userId="a795c42d-832a-4dce-b1d8-09bac981a9d2" providerId="ADAL" clId="{166D12EF-58EE-6C4C-9A24-99C33C59FE65}" dt="2024-11-15T18:42:55.522" v="1113" actId="5736"/>
+          <ac:chgData name="Montecino, Diego" userId="a795c42d-832a-4dce-b1d8-09bac981a9d2" providerId="ADAL" clId="{166D12EF-58EE-6C4C-9A24-99C33C59FE65}" dt="2024-11-15T20:54:24.153" v="1135" actId="5736"/>
           <ac:spMkLst>
             <pc:docMk/>
             <pc:sldMk cId="2695032720" sldId="259"/>
@@ -1350,7 +1374,7 @@
           </ac:spMkLst>
         </pc:spChg>
         <pc:spChg chg="add mod">
-          <ac:chgData name="Montecino, Diego" userId="a795c42d-832a-4dce-b1d8-09bac981a9d2" providerId="ADAL" clId="{166D12EF-58EE-6C4C-9A24-99C33C59FE65}" dt="2024-11-15T18:42:55.522" v="1113" actId="5736"/>
+          <ac:chgData name="Montecino, Diego" userId="a795c42d-832a-4dce-b1d8-09bac981a9d2" providerId="ADAL" clId="{166D12EF-58EE-6C4C-9A24-99C33C59FE65}" dt="2024-11-15T20:54:24.153" v="1135" actId="5736"/>
           <ac:spMkLst>
             <pc:docMk/>
             <pc:sldMk cId="2695032720" sldId="259"/>
@@ -1358,7 +1382,7 @@
           </ac:spMkLst>
         </pc:spChg>
         <pc:spChg chg="add mod">
-          <ac:chgData name="Montecino, Diego" userId="a795c42d-832a-4dce-b1d8-09bac981a9d2" providerId="ADAL" clId="{166D12EF-58EE-6C4C-9A24-99C33C59FE65}" dt="2024-11-15T18:42:55.522" v="1113" actId="5736"/>
+          <ac:chgData name="Montecino, Diego" userId="a795c42d-832a-4dce-b1d8-09bac981a9d2" providerId="ADAL" clId="{166D12EF-58EE-6C4C-9A24-99C33C59FE65}" dt="2024-11-15T20:54:24.153" v="1135" actId="5736"/>
           <ac:spMkLst>
             <pc:docMk/>
             <pc:sldMk cId="2695032720" sldId="259"/>
@@ -1366,15 +1390,23 @@
           </ac:spMkLst>
         </pc:spChg>
         <pc:spChg chg="add mod">
-          <ac:chgData name="Montecino, Diego" userId="a795c42d-832a-4dce-b1d8-09bac981a9d2" providerId="ADAL" clId="{166D12EF-58EE-6C4C-9A24-99C33C59FE65}" dt="2024-11-15T18:42:55.522" v="1113" actId="5736"/>
+          <ac:chgData name="Montecino, Diego" userId="a795c42d-832a-4dce-b1d8-09bac981a9d2" providerId="ADAL" clId="{166D12EF-58EE-6C4C-9A24-99C33C59FE65}" dt="2024-11-15T20:54:24.153" v="1135" actId="5736"/>
           <ac:spMkLst>
             <pc:docMk/>
             <pc:sldMk cId="2695032720" sldId="259"/>
             <ac:spMk id="17" creationId="{0EA884ED-3AE6-A7DC-C731-CA425C2054FF}"/>
           </ac:spMkLst>
         </pc:spChg>
+        <pc:spChg chg="add mod">
+          <ac:chgData name="Montecino, Diego" userId="a795c42d-832a-4dce-b1d8-09bac981a9d2" providerId="ADAL" clId="{166D12EF-58EE-6C4C-9A24-99C33C59FE65}" dt="2024-11-15T20:54:24.153" v="1135" actId="5736"/>
+          <ac:spMkLst>
+            <pc:docMk/>
+            <pc:sldMk cId="2695032720" sldId="259"/>
+            <ac:spMk id="20" creationId="{9E965EC0-C1AB-F7CE-1E41-334C7DC29BB5}"/>
+          </ac:spMkLst>
+        </pc:spChg>
         <pc:spChg chg="mod">
-          <ac:chgData name="Montecino, Diego" userId="a795c42d-832a-4dce-b1d8-09bac981a9d2" providerId="ADAL" clId="{166D12EF-58EE-6C4C-9A24-99C33C59FE65}" dt="2024-11-15T18:42:55.522" v="1113" actId="5736"/>
+          <ac:chgData name="Montecino, Diego" userId="a795c42d-832a-4dce-b1d8-09bac981a9d2" providerId="ADAL" clId="{166D12EF-58EE-6C4C-9A24-99C33C59FE65}" dt="2024-11-15T20:54:24.153" v="1135" actId="5736"/>
           <ac:spMkLst>
             <pc:docMk/>
             <pc:sldMk cId="2695032720" sldId="259"/>
@@ -1382,7 +1414,7 @@
           </ac:spMkLst>
         </pc:spChg>
         <pc:spChg chg="mod">
-          <ac:chgData name="Montecino, Diego" userId="a795c42d-832a-4dce-b1d8-09bac981a9d2" providerId="ADAL" clId="{166D12EF-58EE-6C4C-9A24-99C33C59FE65}" dt="2024-11-15T18:42:55.522" v="1113" actId="5736"/>
+          <ac:chgData name="Montecino, Diego" userId="a795c42d-832a-4dce-b1d8-09bac981a9d2" providerId="ADAL" clId="{166D12EF-58EE-6C4C-9A24-99C33C59FE65}" dt="2024-11-15T20:54:24.153" v="1135" actId="5736"/>
           <ac:spMkLst>
             <pc:docMk/>
             <pc:sldMk cId="2695032720" sldId="259"/>
@@ -1390,7 +1422,7 @@
           </ac:spMkLst>
         </pc:spChg>
         <pc:spChg chg="mod">
-          <ac:chgData name="Montecino, Diego" userId="a795c42d-832a-4dce-b1d8-09bac981a9d2" providerId="ADAL" clId="{166D12EF-58EE-6C4C-9A24-99C33C59FE65}" dt="2024-11-15T18:42:55.522" v="1113" actId="5736"/>
+          <ac:chgData name="Montecino, Diego" userId="a795c42d-832a-4dce-b1d8-09bac981a9d2" providerId="ADAL" clId="{166D12EF-58EE-6C4C-9A24-99C33C59FE65}" dt="2024-11-15T20:54:24.153" v="1135" actId="5736"/>
           <ac:spMkLst>
             <pc:docMk/>
             <pc:sldMk cId="2695032720" sldId="259"/>
@@ -1398,7 +1430,7 @@
           </ac:spMkLst>
         </pc:spChg>
         <pc:spChg chg="mod">
-          <ac:chgData name="Montecino, Diego" userId="a795c42d-832a-4dce-b1d8-09bac981a9d2" providerId="ADAL" clId="{166D12EF-58EE-6C4C-9A24-99C33C59FE65}" dt="2024-11-15T18:42:55.522" v="1113" actId="5736"/>
+          <ac:chgData name="Montecino, Diego" userId="a795c42d-832a-4dce-b1d8-09bac981a9d2" providerId="ADAL" clId="{166D12EF-58EE-6C4C-9A24-99C33C59FE65}" dt="2024-11-15T20:54:24.153" v="1135" actId="5736"/>
           <ac:spMkLst>
             <pc:docMk/>
             <pc:sldMk cId="2695032720" sldId="259"/>
@@ -1406,7 +1438,7 @@
           </ac:spMkLst>
         </pc:spChg>
         <pc:spChg chg="mod">
-          <ac:chgData name="Montecino, Diego" userId="a795c42d-832a-4dce-b1d8-09bac981a9d2" providerId="ADAL" clId="{166D12EF-58EE-6C4C-9A24-99C33C59FE65}" dt="2024-11-15T18:42:55.522" v="1113" actId="5736"/>
+          <ac:chgData name="Montecino, Diego" userId="a795c42d-832a-4dce-b1d8-09bac981a9d2" providerId="ADAL" clId="{166D12EF-58EE-6C4C-9A24-99C33C59FE65}" dt="2024-11-15T20:54:24.153" v="1135" actId="5736"/>
           <ac:spMkLst>
             <pc:docMk/>
             <pc:sldMk cId="2695032720" sldId="259"/>
@@ -1414,7 +1446,7 @@
           </ac:spMkLst>
         </pc:spChg>
         <pc:spChg chg="mod">
-          <ac:chgData name="Montecino, Diego" userId="a795c42d-832a-4dce-b1d8-09bac981a9d2" providerId="ADAL" clId="{166D12EF-58EE-6C4C-9A24-99C33C59FE65}" dt="2024-11-15T18:42:55.522" v="1113" actId="5736"/>
+          <ac:chgData name="Montecino, Diego" userId="a795c42d-832a-4dce-b1d8-09bac981a9d2" providerId="ADAL" clId="{166D12EF-58EE-6C4C-9A24-99C33C59FE65}" dt="2024-11-15T20:54:24.153" v="1135" actId="5736"/>
           <ac:spMkLst>
             <pc:docMk/>
             <pc:sldMk cId="2695032720" sldId="259"/>
@@ -1422,7 +1454,7 @@
           </ac:spMkLst>
         </pc:spChg>
         <pc:spChg chg="mod">
-          <ac:chgData name="Montecino, Diego" userId="a795c42d-832a-4dce-b1d8-09bac981a9d2" providerId="ADAL" clId="{166D12EF-58EE-6C4C-9A24-99C33C59FE65}" dt="2024-11-15T18:42:55.522" v="1113" actId="5736"/>
+          <ac:chgData name="Montecino, Diego" userId="a795c42d-832a-4dce-b1d8-09bac981a9d2" providerId="ADAL" clId="{166D12EF-58EE-6C4C-9A24-99C33C59FE65}" dt="2024-11-15T20:54:24.153" v="1135" actId="5736"/>
           <ac:spMkLst>
             <pc:docMk/>
             <pc:sldMk cId="2695032720" sldId="259"/>
@@ -1430,7 +1462,7 @@
           </ac:spMkLst>
         </pc:spChg>
         <pc:spChg chg="mod">
-          <ac:chgData name="Montecino, Diego" userId="a795c42d-832a-4dce-b1d8-09bac981a9d2" providerId="ADAL" clId="{166D12EF-58EE-6C4C-9A24-99C33C59FE65}" dt="2024-11-15T18:42:55.522" v="1113" actId="5736"/>
+          <ac:chgData name="Montecino, Diego" userId="a795c42d-832a-4dce-b1d8-09bac981a9d2" providerId="ADAL" clId="{166D12EF-58EE-6C4C-9A24-99C33C59FE65}" dt="2024-11-15T20:54:24.153" v="1135" actId="5736"/>
           <ac:spMkLst>
             <pc:docMk/>
             <pc:sldMk cId="2695032720" sldId="259"/>
@@ -1438,7 +1470,7 @@
           </ac:spMkLst>
         </pc:spChg>
         <pc:spChg chg="mod">
-          <ac:chgData name="Montecino, Diego" userId="a795c42d-832a-4dce-b1d8-09bac981a9d2" providerId="ADAL" clId="{166D12EF-58EE-6C4C-9A24-99C33C59FE65}" dt="2024-11-15T18:42:55.522" v="1113" actId="5736"/>
+          <ac:chgData name="Montecino, Diego" userId="a795c42d-832a-4dce-b1d8-09bac981a9d2" providerId="ADAL" clId="{166D12EF-58EE-6C4C-9A24-99C33C59FE65}" dt="2024-11-15T20:54:24.153" v="1135" actId="5736"/>
           <ac:spMkLst>
             <pc:docMk/>
             <pc:sldMk cId="2695032720" sldId="259"/>
@@ -1446,7 +1478,7 @@
           </ac:spMkLst>
         </pc:spChg>
         <pc:spChg chg="mod">
-          <ac:chgData name="Montecino, Diego" userId="a795c42d-832a-4dce-b1d8-09bac981a9d2" providerId="ADAL" clId="{166D12EF-58EE-6C4C-9A24-99C33C59FE65}" dt="2024-11-15T18:42:55.522" v="1113" actId="5736"/>
+          <ac:chgData name="Montecino, Diego" userId="a795c42d-832a-4dce-b1d8-09bac981a9d2" providerId="ADAL" clId="{166D12EF-58EE-6C4C-9A24-99C33C59FE65}" dt="2024-11-15T20:54:24.153" v="1135" actId="5736"/>
           <ac:spMkLst>
             <pc:docMk/>
             <pc:sldMk cId="2695032720" sldId="259"/>
@@ -1454,7 +1486,7 @@
           </ac:spMkLst>
         </pc:spChg>
         <pc:spChg chg="mod">
-          <ac:chgData name="Montecino, Diego" userId="a795c42d-832a-4dce-b1d8-09bac981a9d2" providerId="ADAL" clId="{166D12EF-58EE-6C4C-9A24-99C33C59FE65}" dt="2024-11-15T18:42:55.522" v="1113" actId="5736"/>
+          <ac:chgData name="Montecino, Diego" userId="a795c42d-832a-4dce-b1d8-09bac981a9d2" providerId="ADAL" clId="{166D12EF-58EE-6C4C-9A24-99C33C59FE65}" dt="2024-11-15T20:54:24.153" v="1135" actId="5736"/>
           <ac:spMkLst>
             <pc:docMk/>
             <pc:sldMk cId="2695032720" sldId="259"/>
@@ -1462,7 +1494,7 @@
           </ac:spMkLst>
         </pc:spChg>
         <pc:spChg chg="mod">
-          <ac:chgData name="Montecino, Diego" userId="a795c42d-832a-4dce-b1d8-09bac981a9d2" providerId="ADAL" clId="{166D12EF-58EE-6C4C-9A24-99C33C59FE65}" dt="2024-11-15T18:42:55.522" v="1113" actId="5736"/>
+          <ac:chgData name="Montecino, Diego" userId="a795c42d-832a-4dce-b1d8-09bac981a9d2" providerId="ADAL" clId="{166D12EF-58EE-6C4C-9A24-99C33C59FE65}" dt="2024-11-15T20:54:24.153" v="1135" actId="5736"/>
           <ac:spMkLst>
             <pc:docMk/>
             <pc:sldMk cId="2695032720" sldId="259"/>
@@ -1470,7 +1502,7 @@
           </ac:spMkLst>
         </pc:spChg>
         <pc:spChg chg="mod">
-          <ac:chgData name="Montecino, Diego" userId="a795c42d-832a-4dce-b1d8-09bac981a9d2" providerId="ADAL" clId="{166D12EF-58EE-6C4C-9A24-99C33C59FE65}" dt="2024-11-15T18:42:55.522" v="1113" actId="5736"/>
+          <ac:chgData name="Montecino, Diego" userId="a795c42d-832a-4dce-b1d8-09bac981a9d2" providerId="ADAL" clId="{166D12EF-58EE-6C4C-9A24-99C33C59FE65}" dt="2024-11-15T20:54:24.153" v="1135" actId="5736"/>
           <ac:spMkLst>
             <pc:docMk/>
             <pc:sldMk cId="2695032720" sldId="259"/>
@@ -1478,7 +1510,7 @@
           </ac:spMkLst>
         </pc:spChg>
         <pc:spChg chg="mod">
-          <ac:chgData name="Montecino, Diego" userId="a795c42d-832a-4dce-b1d8-09bac981a9d2" providerId="ADAL" clId="{166D12EF-58EE-6C4C-9A24-99C33C59FE65}" dt="2024-11-15T18:42:55.522" v="1113" actId="5736"/>
+          <ac:chgData name="Montecino, Diego" userId="a795c42d-832a-4dce-b1d8-09bac981a9d2" providerId="ADAL" clId="{166D12EF-58EE-6C4C-9A24-99C33C59FE65}" dt="2024-11-15T20:54:24.153" v="1135" actId="5736"/>
           <ac:spMkLst>
             <pc:docMk/>
             <pc:sldMk cId="2695032720" sldId="259"/>
@@ -1486,7 +1518,7 @@
           </ac:spMkLst>
         </pc:spChg>
         <pc:spChg chg="mod">
-          <ac:chgData name="Montecino, Diego" userId="a795c42d-832a-4dce-b1d8-09bac981a9d2" providerId="ADAL" clId="{166D12EF-58EE-6C4C-9A24-99C33C59FE65}" dt="2024-11-15T18:42:55.522" v="1113" actId="5736"/>
+          <ac:chgData name="Montecino, Diego" userId="a795c42d-832a-4dce-b1d8-09bac981a9d2" providerId="ADAL" clId="{166D12EF-58EE-6C4C-9A24-99C33C59FE65}" dt="2024-11-15T20:54:24.153" v="1135" actId="5736"/>
           <ac:spMkLst>
             <pc:docMk/>
             <pc:sldMk cId="2695032720" sldId="259"/>
@@ -1494,7 +1526,7 @@
           </ac:spMkLst>
         </pc:spChg>
         <pc:spChg chg="mod">
-          <ac:chgData name="Montecino, Diego" userId="a795c42d-832a-4dce-b1d8-09bac981a9d2" providerId="ADAL" clId="{166D12EF-58EE-6C4C-9A24-99C33C59FE65}" dt="2024-11-15T18:42:55.522" v="1113" actId="5736"/>
+          <ac:chgData name="Montecino, Diego" userId="a795c42d-832a-4dce-b1d8-09bac981a9d2" providerId="ADAL" clId="{166D12EF-58EE-6C4C-9A24-99C33C59FE65}" dt="2024-11-15T20:54:24.153" v="1135" actId="5736"/>
           <ac:spMkLst>
             <pc:docMk/>
             <pc:sldMk cId="2695032720" sldId="259"/>
@@ -1502,7 +1534,7 @@
           </ac:spMkLst>
         </pc:spChg>
         <pc:spChg chg="mod">
-          <ac:chgData name="Montecino, Diego" userId="a795c42d-832a-4dce-b1d8-09bac981a9d2" providerId="ADAL" clId="{166D12EF-58EE-6C4C-9A24-99C33C59FE65}" dt="2024-11-15T18:42:55.522" v="1113" actId="5736"/>
+          <ac:chgData name="Montecino, Diego" userId="a795c42d-832a-4dce-b1d8-09bac981a9d2" providerId="ADAL" clId="{166D12EF-58EE-6C4C-9A24-99C33C59FE65}" dt="2024-11-15T20:54:24.153" v="1135" actId="5736"/>
           <ac:spMkLst>
             <pc:docMk/>
             <pc:sldMk cId="2695032720" sldId="259"/>
@@ -1510,7 +1542,7 @@
           </ac:spMkLst>
         </pc:spChg>
         <pc:grpChg chg="mod">
-          <ac:chgData name="Montecino, Diego" userId="a795c42d-832a-4dce-b1d8-09bac981a9d2" providerId="ADAL" clId="{166D12EF-58EE-6C4C-9A24-99C33C59FE65}" dt="2024-11-15T18:42:55.522" v="1113" actId="5736"/>
+          <ac:chgData name="Montecino, Diego" userId="a795c42d-832a-4dce-b1d8-09bac981a9d2" providerId="ADAL" clId="{166D12EF-58EE-6C4C-9A24-99C33C59FE65}" dt="2024-11-15T20:54:24.153" v="1135" actId="5736"/>
           <ac:grpSpMkLst>
             <pc:docMk/>
             <pc:sldMk cId="2695032720" sldId="259"/>
@@ -1518,7 +1550,7 @@
           </ac:grpSpMkLst>
         </pc:grpChg>
         <pc:grpChg chg="mod">
-          <ac:chgData name="Montecino, Diego" userId="a795c42d-832a-4dce-b1d8-09bac981a9d2" providerId="ADAL" clId="{166D12EF-58EE-6C4C-9A24-99C33C59FE65}" dt="2024-11-15T18:42:55.522" v="1113" actId="5736"/>
+          <ac:chgData name="Montecino, Diego" userId="a795c42d-832a-4dce-b1d8-09bac981a9d2" providerId="ADAL" clId="{166D12EF-58EE-6C4C-9A24-99C33C59FE65}" dt="2024-11-15T20:54:24.153" v="1135" actId="5736"/>
           <ac:grpSpMkLst>
             <pc:docMk/>
             <pc:sldMk cId="2695032720" sldId="259"/>
@@ -1526,7 +1558,7 @@
           </ac:grpSpMkLst>
         </pc:grpChg>
         <pc:graphicFrameChg chg="mod">
-          <ac:chgData name="Montecino, Diego" userId="a795c42d-832a-4dce-b1d8-09bac981a9d2" providerId="ADAL" clId="{166D12EF-58EE-6C4C-9A24-99C33C59FE65}" dt="2024-11-15T18:42:55.522" v="1113" actId="5736"/>
+          <ac:chgData name="Montecino, Diego" userId="a795c42d-832a-4dce-b1d8-09bac981a9d2" providerId="ADAL" clId="{166D12EF-58EE-6C4C-9A24-99C33C59FE65}" dt="2024-11-15T20:54:24.153" v="1135" actId="5736"/>
           <ac:graphicFrameMkLst>
             <pc:docMk/>
             <pc:sldMk cId="2695032720" sldId="259"/>
@@ -1534,7 +1566,7 @@
           </ac:graphicFrameMkLst>
         </pc:graphicFrameChg>
         <pc:cxnChg chg="add mod">
-          <ac:chgData name="Montecino, Diego" userId="a795c42d-832a-4dce-b1d8-09bac981a9d2" providerId="ADAL" clId="{166D12EF-58EE-6C4C-9A24-99C33C59FE65}" dt="2024-11-15T18:42:55.522" v="1113" actId="5736"/>
+          <ac:chgData name="Montecino, Diego" userId="a795c42d-832a-4dce-b1d8-09bac981a9d2" providerId="ADAL" clId="{166D12EF-58EE-6C4C-9A24-99C33C59FE65}" dt="2024-11-15T20:54:24.153" v="1135" actId="5736"/>
           <ac:cxnSpMkLst>
             <pc:docMk/>
             <pc:sldMk cId="2695032720" sldId="259"/>
@@ -1542,7 +1574,7 @@
           </ac:cxnSpMkLst>
         </pc:cxnChg>
         <pc:cxnChg chg="add mod">
-          <ac:chgData name="Montecino, Diego" userId="a795c42d-832a-4dce-b1d8-09bac981a9d2" providerId="ADAL" clId="{166D12EF-58EE-6C4C-9A24-99C33C59FE65}" dt="2024-11-15T18:42:55.522" v="1113" actId="5736"/>
+          <ac:chgData name="Montecino, Diego" userId="a795c42d-832a-4dce-b1d8-09bac981a9d2" providerId="ADAL" clId="{166D12EF-58EE-6C4C-9A24-99C33C59FE65}" dt="2024-11-15T20:54:24.153" v="1135" actId="5736"/>
           <ac:cxnSpMkLst>
             <pc:docMk/>
             <pc:sldMk cId="2695032720" sldId="259"/>
@@ -1550,7 +1582,7 @@
           </ac:cxnSpMkLst>
         </pc:cxnChg>
         <pc:cxnChg chg="add mod">
-          <ac:chgData name="Montecino, Diego" userId="a795c42d-832a-4dce-b1d8-09bac981a9d2" providerId="ADAL" clId="{166D12EF-58EE-6C4C-9A24-99C33C59FE65}" dt="2024-11-15T18:42:55.522" v="1113" actId="5736"/>
+          <ac:chgData name="Montecino, Diego" userId="a795c42d-832a-4dce-b1d8-09bac981a9d2" providerId="ADAL" clId="{166D12EF-58EE-6C4C-9A24-99C33C59FE65}" dt="2024-11-15T20:54:24.153" v="1135" actId="5736"/>
           <ac:cxnSpMkLst>
             <pc:docMk/>
             <pc:sldMk cId="2695032720" sldId="259"/>
@@ -1558,7 +1590,7 @@
           </ac:cxnSpMkLst>
         </pc:cxnChg>
         <pc:cxnChg chg="add mod">
-          <ac:chgData name="Montecino, Diego" userId="a795c42d-832a-4dce-b1d8-09bac981a9d2" providerId="ADAL" clId="{166D12EF-58EE-6C4C-9A24-99C33C59FE65}" dt="2024-11-15T18:42:55.522" v="1113" actId="5736"/>
+          <ac:chgData name="Montecino, Diego" userId="a795c42d-832a-4dce-b1d8-09bac981a9d2" providerId="ADAL" clId="{166D12EF-58EE-6C4C-9A24-99C33C59FE65}" dt="2024-11-15T20:54:24.153" v="1135" actId="5736"/>
           <ac:cxnSpMkLst>
             <pc:docMk/>
             <pc:sldMk cId="2695032720" sldId="259"/>
@@ -1566,7 +1598,7 @@
           </ac:cxnSpMkLst>
         </pc:cxnChg>
         <pc:cxnChg chg="mod">
-          <ac:chgData name="Montecino, Diego" userId="a795c42d-832a-4dce-b1d8-09bac981a9d2" providerId="ADAL" clId="{166D12EF-58EE-6C4C-9A24-99C33C59FE65}" dt="2024-11-15T18:42:55.522" v="1113" actId="5736"/>
+          <ac:chgData name="Montecino, Diego" userId="a795c42d-832a-4dce-b1d8-09bac981a9d2" providerId="ADAL" clId="{166D12EF-58EE-6C4C-9A24-99C33C59FE65}" dt="2024-11-15T20:54:24.153" v="1135" actId="5736"/>
           <ac:cxnSpMkLst>
             <pc:docMk/>
             <pc:sldMk cId="2695032720" sldId="259"/>
@@ -1574,7 +1606,7 @@
           </ac:cxnSpMkLst>
         </pc:cxnChg>
         <pc:cxnChg chg="add mod">
-          <ac:chgData name="Montecino, Diego" userId="a795c42d-832a-4dce-b1d8-09bac981a9d2" providerId="ADAL" clId="{166D12EF-58EE-6C4C-9A24-99C33C59FE65}" dt="2024-11-15T18:42:55.522" v="1113" actId="5736"/>
+          <ac:chgData name="Montecino, Diego" userId="a795c42d-832a-4dce-b1d8-09bac981a9d2" providerId="ADAL" clId="{166D12EF-58EE-6C4C-9A24-99C33C59FE65}" dt="2024-11-15T20:54:24.153" v="1135" actId="5736"/>
           <ac:cxnSpMkLst>
             <pc:docMk/>
             <pc:sldMk cId="2695032720" sldId="259"/>
@@ -1582,7 +1614,7 @@
           </ac:cxnSpMkLst>
         </pc:cxnChg>
         <pc:cxnChg chg="add mod">
-          <ac:chgData name="Montecino, Diego" userId="a795c42d-832a-4dce-b1d8-09bac981a9d2" providerId="ADAL" clId="{166D12EF-58EE-6C4C-9A24-99C33C59FE65}" dt="2024-11-15T18:42:55.522" v="1113" actId="5736"/>
+          <ac:chgData name="Montecino, Diego" userId="a795c42d-832a-4dce-b1d8-09bac981a9d2" providerId="ADAL" clId="{166D12EF-58EE-6C4C-9A24-99C33C59FE65}" dt="2024-11-15T20:54:24.153" v="1135" actId="5736"/>
           <ac:cxnSpMkLst>
             <pc:docMk/>
             <pc:sldMk cId="2695032720" sldId="259"/>
@@ -1590,7 +1622,7 @@
           </ac:cxnSpMkLst>
         </pc:cxnChg>
         <pc:cxnChg chg="add mod">
-          <ac:chgData name="Montecino, Diego" userId="a795c42d-832a-4dce-b1d8-09bac981a9d2" providerId="ADAL" clId="{166D12EF-58EE-6C4C-9A24-99C33C59FE65}" dt="2024-11-15T18:42:55.522" v="1113" actId="5736"/>
+          <ac:chgData name="Montecino, Diego" userId="a795c42d-832a-4dce-b1d8-09bac981a9d2" providerId="ADAL" clId="{166D12EF-58EE-6C4C-9A24-99C33C59FE65}" dt="2024-11-15T20:54:24.153" v="1135" actId="5736"/>
           <ac:cxnSpMkLst>
             <pc:docMk/>
             <pc:sldMk cId="2695032720" sldId="259"/>
@@ -1598,15 +1630,23 @@
           </ac:cxnSpMkLst>
         </pc:cxnChg>
         <pc:cxnChg chg="add mod">
-          <ac:chgData name="Montecino, Diego" userId="a795c42d-832a-4dce-b1d8-09bac981a9d2" providerId="ADAL" clId="{166D12EF-58EE-6C4C-9A24-99C33C59FE65}" dt="2024-11-15T18:42:55.522" v="1113" actId="5736"/>
+          <ac:chgData name="Montecino, Diego" userId="a795c42d-832a-4dce-b1d8-09bac981a9d2" providerId="ADAL" clId="{166D12EF-58EE-6C4C-9A24-99C33C59FE65}" dt="2024-11-15T20:54:24.153" v="1135" actId="5736"/>
           <ac:cxnSpMkLst>
             <pc:docMk/>
             <pc:sldMk cId="2695032720" sldId="259"/>
             <ac:cxnSpMk id="18" creationId="{76C06E5B-E2B6-C6FC-E627-7EFF705B7A9F}"/>
           </ac:cxnSpMkLst>
         </pc:cxnChg>
+        <pc:cxnChg chg="add mod">
+          <ac:chgData name="Montecino, Diego" userId="a795c42d-832a-4dce-b1d8-09bac981a9d2" providerId="ADAL" clId="{166D12EF-58EE-6C4C-9A24-99C33C59FE65}" dt="2024-11-15T20:54:24.153" v="1135" actId="5736"/>
+          <ac:cxnSpMkLst>
+            <pc:docMk/>
+            <pc:sldMk cId="2695032720" sldId="259"/>
+            <ac:cxnSpMk id="19" creationId="{68CD4F76-3504-822F-3A5A-BD04683782BF}"/>
+          </ac:cxnSpMkLst>
+        </pc:cxnChg>
         <pc:cxnChg chg="mod">
-          <ac:chgData name="Montecino, Diego" userId="a795c42d-832a-4dce-b1d8-09bac981a9d2" providerId="ADAL" clId="{166D12EF-58EE-6C4C-9A24-99C33C59FE65}" dt="2024-11-15T18:42:55.522" v="1113" actId="5736"/>
+          <ac:chgData name="Montecino, Diego" userId="a795c42d-832a-4dce-b1d8-09bac981a9d2" providerId="ADAL" clId="{166D12EF-58EE-6C4C-9A24-99C33C59FE65}" dt="2024-11-15T20:54:24.153" v="1135" actId="5736"/>
           <ac:cxnSpMkLst>
             <pc:docMk/>
             <pc:sldMk cId="2695032720" sldId="259"/>
@@ -1614,7 +1654,7 @@
           </ac:cxnSpMkLst>
         </pc:cxnChg>
         <pc:cxnChg chg="mod">
-          <ac:chgData name="Montecino, Diego" userId="a795c42d-832a-4dce-b1d8-09bac981a9d2" providerId="ADAL" clId="{166D12EF-58EE-6C4C-9A24-99C33C59FE65}" dt="2024-11-15T18:42:55.522" v="1113" actId="5736"/>
+          <ac:chgData name="Montecino, Diego" userId="a795c42d-832a-4dce-b1d8-09bac981a9d2" providerId="ADAL" clId="{166D12EF-58EE-6C4C-9A24-99C33C59FE65}" dt="2024-11-15T20:54:24.153" v="1135" actId="5736"/>
           <ac:cxnSpMkLst>
             <pc:docMk/>
             <pc:sldMk cId="2695032720" sldId="259"/>
@@ -1622,7 +1662,7 @@
           </ac:cxnSpMkLst>
         </pc:cxnChg>
         <pc:cxnChg chg="mod">
-          <ac:chgData name="Montecino, Diego" userId="a795c42d-832a-4dce-b1d8-09bac981a9d2" providerId="ADAL" clId="{166D12EF-58EE-6C4C-9A24-99C33C59FE65}" dt="2024-11-15T18:42:55.522" v="1113" actId="5736"/>
+          <ac:chgData name="Montecino, Diego" userId="a795c42d-832a-4dce-b1d8-09bac981a9d2" providerId="ADAL" clId="{166D12EF-58EE-6C4C-9A24-99C33C59FE65}" dt="2024-11-15T20:54:24.153" v="1135" actId="5736"/>
           <ac:cxnSpMkLst>
             <pc:docMk/>
             <pc:sldMk cId="2695032720" sldId="259"/>
@@ -1630,7 +1670,7 @@
           </ac:cxnSpMkLst>
         </pc:cxnChg>
         <pc:cxnChg chg="mod">
-          <ac:chgData name="Montecino, Diego" userId="a795c42d-832a-4dce-b1d8-09bac981a9d2" providerId="ADAL" clId="{166D12EF-58EE-6C4C-9A24-99C33C59FE65}" dt="2024-11-15T18:42:55.522" v="1113" actId="5736"/>
+          <ac:chgData name="Montecino, Diego" userId="a795c42d-832a-4dce-b1d8-09bac981a9d2" providerId="ADAL" clId="{166D12EF-58EE-6C4C-9A24-99C33C59FE65}" dt="2024-11-15T20:54:24.153" v="1135" actId="5736"/>
           <ac:cxnSpMkLst>
             <pc:docMk/>
             <pc:sldMk cId="2695032720" sldId="259"/>
@@ -1638,7 +1678,7 @@
           </ac:cxnSpMkLst>
         </pc:cxnChg>
         <pc:cxnChg chg="mod">
-          <ac:chgData name="Montecino, Diego" userId="a795c42d-832a-4dce-b1d8-09bac981a9d2" providerId="ADAL" clId="{166D12EF-58EE-6C4C-9A24-99C33C59FE65}" dt="2024-11-15T18:42:55.522" v="1113" actId="5736"/>
+          <ac:chgData name="Montecino, Diego" userId="a795c42d-832a-4dce-b1d8-09bac981a9d2" providerId="ADAL" clId="{166D12EF-58EE-6C4C-9A24-99C33C59FE65}" dt="2024-11-15T20:54:24.153" v="1135" actId="5736"/>
           <ac:cxnSpMkLst>
             <pc:docMk/>
             <pc:sldMk cId="2695032720" sldId="259"/>
@@ -1646,7 +1686,7 @@
           </ac:cxnSpMkLst>
         </pc:cxnChg>
         <pc:cxnChg chg="mod">
-          <ac:chgData name="Montecino, Diego" userId="a795c42d-832a-4dce-b1d8-09bac981a9d2" providerId="ADAL" clId="{166D12EF-58EE-6C4C-9A24-99C33C59FE65}" dt="2024-11-15T18:42:55.522" v="1113" actId="5736"/>
+          <ac:chgData name="Montecino, Diego" userId="a795c42d-832a-4dce-b1d8-09bac981a9d2" providerId="ADAL" clId="{166D12EF-58EE-6C4C-9A24-99C33C59FE65}" dt="2024-11-15T20:54:24.153" v="1135" actId="5736"/>
           <ac:cxnSpMkLst>
             <pc:docMk/>
             <pc:sldMk cId="2695032720" sldId="259"/>
@@ -1654,7 +1694,7 @@
           </ac:cxnSpMkLst>
         </pc:cxnChg>
         <pc:cxnChg chg="mod">
-          <ac:chgData name="Montecino, Diego" userId="a795c42d-832a-4dce-b1d8-09bac981a9d2" providerId="ADAL" clId="{166D12EF-58EE-6C4C-9A24-99C33C59FE65}" dt="2024-11-15T18:42:55.522" v="1113" actId="5736"/>
+          <ac:chgData name="Montecino, Diego" userId="a795c42d-832a-4dce-b1d8-09bac981a9d2" providerId="ADAL" clId="{166D12EF-58EE-6C4C-9A24-99C33C59FE65}" dt="2024-11-15T20:54:24.153" v="1135" actId="5736"/>
           <ac:cxnSpMkLst>
             <pc:docMk/>
             <pc:sldMk cId="2695032720" sldId="259"/>
@@ -1662,7 +1702,7 @@
           </ac:cxnSpMkLst>
         </pc:cxnChg>
         <pc:cxnChg chg="mod">
-          <ac:chgData name="Montecino, Diego" userId="a795c42d-832a-4dce-b1d8-09bac981a9d2" providerId="ADAL" clId="{166D12EF-58EE-6C4C-9A24-99C33C59FE65}" dt="2024-11-15T18:42:55.522" v="1113" actId="5736"/>
+          <ac:chgData name="Montecino, Diego" userId="a795c42d-832a-4dce-b1d8-09bac981a9d2" providerId="ADAL" clId="{166D12EF-58EE-6C4C-9A24-99C33C59FE65}" dt="2024-11-15T20:54:24.153" v="1135" actId="5736"/>
           <ac:cxnSpMkLst>
             <pc:docMk/>
             <pc:sldMk cId="2695032720" sldId="259"/>
@@ -1670,7 +1710,7 @@
           </ac:cxnSpMkLst>
         </pc:cxnChg>
         <pc:cxnChg chg="mod">
-          <ac:chgData name="Montecino, Diego" userId="a795c42d-832a-4dce-b1d8-09bac981a9d2" providerId="ADAL" clId="{166D12EF-58EE-6C4C-9A24-99C33C59FE65}" dt="2024-11-15T18:42:55.522" v="1113" actId="5736"/>
+          <ac:chgData name="Montecino, Diego" userId="a795c42d-832a-4dce-b1d8-09bac981a9d2" providerId="ADAL" clId="{166D12EF-58EE-6C4C-9A24-99C33C59FE65}" dt="2024-11-15T20:54:24.153" v="1135" actId="5736"/>
           <ac:cxnSpMkLst>
             <pc:docMk/>
             <pc:sldMk cId="2695032720" sldId="259"/>
@@ -1678,7 +1718,7 @@
           </ac:cxnSpMkLst>
         </pc:cxnChg>
         <pc:cxnChg chg="mod">
-          <ac:chgData name="Montecino, Diego" userId="a795c42d-832a-4dce-b1d8-09bac981a9d2" providerId="ADAL" clId="{166D12EF-58EE-6C4C-9A24-99C33C59FE65}" dt="2024-11-15T18:42:55.522" v="1113" actId="5736"/>
+          <ac:chgData name="Montecino, Diego" userId="a795c42d-832a-4dce-b1d8-09bac981a9d2" providerId="ADAL" clId="{166D12EF-58EE-6C4C-9A24-99C33C59FE65}" dt="2024-11-15T20:54:24.153" v="1135" actId="5736"/>
           <ac:cxnSpMkLst>
             <pc:docMk/>
             <pc:sldMk cId="2695032720" sldId="259"/>
@@ -1686,7 +1726,7 @@
           </ac:cxnSpMkLst>
         </pc:cxnChg>
         <pc:cxnChg chg="mod">
-          <ac:chgData name="Montecino, Diego" userId="a795c42d-832a-4dce-b1d8-09bac981a9d2" providerId="ADAL" clId="{166D12EF-58EE-6C4C-9A24-99C33C59FE65}" dt="2024-11-15T18:42:55.522" v="1113" actId="5736"/>
+          <ac:chgData name="Montecino, Diego" userId="a795c42d-832a-4dce-b1d8-09bac981a9d2" providerId="ADAL" clId="{166D12EF-58EE-6C4C-9A24-99C33C59FE65}" dt="2024-11-15T20:54:24.153" v="1135" actId="5736"/>
           <ac:cxnSpMkLst>
             <pc:docMk/>
             <pc:sldMk cId="2695032720" sldId="259"/>
@@ -1694,7 +1734,7 @@
           </ac:cxnSpMkLst>
         </pc:cxnChg>
         <pc:cxnChg chg="mod">
-          <ac:chgData name="Montecino, Diego" userId="a795c42d-832a-4dce-b1d8-09bac981a9d2" providerId="ADAL" clId="{166D12EF-58EE-6C4C-9A24-99C33C59FE65}" dt="2024-11-15T18:42:55.522" v="1113" actId="5736"/>
+          <ac:chgData name="Montecino, Diego" userId="a795c42d-832a-4dce-b1d8-09bac981a9d2" providerId="ADAL" clId="{166D12EF-58EE-6C4C-9A24-99C33C59FE65}" dt="2024-11-15T20:54:24.153" v="1135" actId="5736"/>
           <ac:cxnSpMkLst>
             <pc:docMk/>
             <pc:sldMk cId="2695032720" sldId="259"/>
@@ -1702,7 +1742,7 @@
           </ac:cxnSpMkLst>
         </pc:cxnChg>
         <pc:cxnChg chg="mod">
-          <ac:chgData name="Montecino, Diego" userId="a795c42d-832a-4dce-b1d8-09bac981a9d2" providerId="ADAL" clId="{166D12EF-58EE-6C4C-9A24-99C33C59FE65}" dt="2024-11-15T18:42:55.522" v="1113" actId="5736"/>
+          <ac:chgData name="Montecino, Diego" userId="a795c42d-832a-4dce-b1d8-09bac981a9d2" providerId="ADAL" clId="{166D12EF-58EE-6C4C-9A24-99C33C59FE65}" dt="2024-11-15T20:54:24.153" v="1135" actId="5736"/>
           <ac:cxnSpMkLst>
             <pc:docMk/>
             <pc:sldMk cId="2695032720" sldId="259"/>
@@ -1710,7 +1750,7 @@
           </ac:cxnSpMkLst>
         </pc:cxnChg>
         <pc:cxnChg chg="mod">
-          <ac:chgData name="Montecino, Diego" userId="a795c42d-832a-4dce-b1d8-09bac981a9d2" providerId="ADAL" clId="{166D12EF-58EE-6C4C-9A24-99C33C59FE65}" dt="2024-11-15T18:42:55.522" v="1113" actId="5736"/>
+          <ac:chgData name="Montecino, Diego" userId="a795c42d-832a-4dce-b1d8-09bac981a9d2" providerId="ADAL" clId="{166D12EF-58EE-6C4C-9A24-99C33C59FE65}" dt="2024-11-15T20:54:24.153" v="1135" actId="5736"/>
           <ac:cxnSpMkLst>
             <pc:docMk/>
             <pc:sldMk cId="2695032720" sldId="259"/>
@@ -1718,7 +1758,7 @@
           </ac:cxnSpMkLst>
         </pc:cxnChg>
         <pc:cxnChg chg="mod">
-          <ac:chgData name="Montecino, Diego" userId="a795c42d-832a-4dce-b1d8-09bac981a9d2" providerId="ADAL" clId="{166D12EF-58EE-6C4C-9A24-99C33C59FE65}" dt="2024-11-15T18:42:55.522" v="1113" actId="5736"/>
+          <ac:chgData name="Montecino, Diego" userId="a795c42d-832a-4dce-b1d8-09bac981a9d2" providerId="ADAL" clId="{166D12EF-58EE-6C4C-9A24-99C33C59FE65}" dt="2024-11-15T20:54:24.153" v="1135" actId="5736"/>
           <ac:cxnSpMkLst>
             <pc:docMk/>
             <pc:sldMk cId="2695032720" sldId="259"/>
@@ -1726,7 +1766,7 @@
           </ac:cxnSpMkLst>
         </pc:cxnChg>
         <pc:cxnChg chg="mod">
-          <ac:chgData name="Montecino, Diego" userId="a795c42d-832a-4dce-b1d8-09bac981a9d2" providerId="ADAL" clId="{166D12EF-58EE-6C4C-9A24-99C33C59FE65}" dt="2024-11-15T18:42:55.522" v="1113" actId="5736"/>
+          <ac:chgData name="Montecino, Diego" userId="a795c42d-832a-4dce-b1d8-09bac981a9d2" providerId="ADAL" clId="{166D12EF-58EE-6C4C-9A24-99C33C59FE65}" dt="2024-11-15T20:54:24.153" v="1135" actId="5736"/>
           <ac:cxnSpMkLst>
             <pc:docMk/>
             <pc:sldMk cId="2695032720" sldId="259"/>
@@ -1734,7 +1774,7 @@
           </ac:cxnSpMkLst>
         </pc:cxnChg>
         <pc:cxnChg chg="mod">
-          <ac:chgData name="Montecino, Diego" userId="a795c42d-832a-4dce-b1d8-09bac981a9d2" providerId="ADAL" clId="{166D12EF-58EE-6C4C-9A24-99C33C59FE65}" dt="2024-11-15T18:42:55.522" v="1113" actId="5736"/>
+          <ac:chgData name="Montecino, Diego" userId="a795c42d-832a-4dce-b1d8-09bac981a9d2" providerId="ADAL" clId="{166D12EF-58EE-6C4C-9A24-99C33C59FE65}" dt="2024-11-15T20:54:24.153" v="1135" actId="5736"/>
           <ac:cxnSpMkLst>
             <pc:docMk/>
             <pc:sldMk cId="2695032720" sldId="259"/>
@@ -1742,7 +1782,7 @@
           </ac:cxnSpMkLst>
         </pc:cxnChg>
         <pc:cxnChg chg="mod">
-          <ac:chgData name="Montecino, Diego" userId="a795c42d-832a-4dce-b1d8-09bac981a9d2" providerId="ADAL" clId="{166D12EF-58EE-6C4C-9A24-99C33C59FE65}" dt="2024-11-15T18:42:55.522" v="1113" actId="5736"/>
+          <ac:chgData name="Montecino, Diego" userId="a795c42d-832a-4dce-b1d8-09bac981a9d2" providerId="ADAL" clId="{166D12EF-58EE-6C4C-9A24-99C33C59FE65}" dt="2024-11-15T20:54:24.153" v="1135" actId="5736"/>
           <ac:cxnSpMkLst>
             <pc:docMk/>
             <pc:sldMk cId="2695032720" sldId="259"/>
@@ -1750,7 +1790,7 @@
           </ac:cxnSpMkLst>
         </pc:cxnChg>
         <pc:cxnChg chg="mod">
-          <ac:chgData name="Montecino, Diego" userId="a795c42d-832a-4dce-b1d8-09bac981a9d2" providerId="ADAL" clId="{166D12EF-58EE-6C4C-9A24-99C33C59FE65}" dt="2024-11-15T18:42:55.522" v="1113" actId="5736"/>
+          <ac:chgData name="Montecino, Diego" userId="a795c42d-832a-4dce-b1d8-09bac981a9d2" providerId="ADAL" clId="{166D12EF-58EE-6C4C-9A24-99C33C59FE65}" dt="2024-11-15T20:54:24.153" v="1135" actId="5736"/>
           <ac:cxnSpMkLst>
             <pc:docMk/>
             <pc:sldMk cId="2695032720" sldId="259"/>
@@ -1758,7 +1798,7 @@
           </ac:cxnSpMkLst>
         </pc:cxnChg>
         <pc:cxnChg chg="mod">
-          <ac:chgData name="Montecino, Diego" userId="a795c42d-832a-4dce-b1d8-09bac981a9d2" providerId="ADAL" clId="{166D12EF-58EE-6C4C-9A24-99C33C59FE65}" dt="2024-11-15T18:42:55.522" v="1113" actId="5736"/>
+          <ac:chgData name="Montecino, Diego" userId="a795c42d-832a-4dce-b1d8-09bac981a9d2" providerId="ADAL" clId="{166D12EF-58EE-6C4C-9A24-99C33C59FE65}" dt="2024-11-15T20:54:24.153" v="1135" actId="5736"/>
           <ac:cxnSpMkLst>
             <pc:docMk/>
             <pc:sldMk cId="2695032720" sldId="259"/>
@@ -1766,7 +1806,7 @@
           </ac:cxnSpMkLst>
         </pc:cxnChg>
         <pc:cxnChg chg="mod">
-          <ac:chgData name="Montecino, Diego" userId="a795c42d-832a-4dce-b1d8-09bac981a9d2" providerId="ADAL" clId="{166D12EF-58EE-6C4C-9A24-99C33C59FE65}" dt="2024-11-15T18:42:55.522" v="1113" actId="5736"/>
+          <ac:chgData name="Montecino, Diego" userId="a795c42d-832a-4dce-b1d8-09bac981a9d2" providerId="ADAL" clId="{166D12EF-58EE-6C4C-9A24-99C33C59FE65}" dt="2024-11-15T20:54:24.153" v="1135" actId="5736"/>
           <ac:cxnSpMkLst>
             <pc:docMk/>
             <pc:sldMk cId="2695032720" sldId="259"/>
@@ -1775,13 +1815,13 @@
         </pc:cxnChg>
       </pc:sldChg>
       <pc:sldChg chg="addSp delSp modSp add mod">
-        <pc:chgData name="Montecino, Diego" userId="a795c42d-832a-4dce-b1d8-09bac981a9d2" providerId="ADAL" clId="{166D12EF-58EE-6C4C-9A24-99C33C59FE65}" dt="2024-11-15T18:37:53.741" v="1087" actId="5736"/>
+        <pc:chgData name="Montecino, Diego" userId="a795c42d-832a-4dce-b1d8-09bac981a9d2" providerId="ADAL" clId="{166D12EF-58EE-6C4C-9A24-99C33C59FE65}" dt="2024-11-15T20:54:37.034" v="1136" actId="5736"/>
         <pc:sldMkLst>
           <pc:docMk/>
           <pc:sldMk cId="201650809" sldId="260"/>
         </pc:sldMkLst>
         <pc:spChg chg="add mod">
-          <ac:chgData name="Montecino, Diego" userId="a795c42d-832a-4dce-b1d8-09bac981a9d2" providerId="ADAL" clId="{166D12EF-58EE-6C4C-9A24-99C33C59FE65}" dt="2024-11-15T18:37:53.741" v="1087" actId="5736"/>
+          <ac:chgData name="Montecino, Diego" userId="a795c42d-832a-4dce-b1d8-09bac981a9d2" providerId="ADAL" clId="{166D12EF-58EE-6C4C-9A24-99C33C59FE65}" dt="2024-11-15T20:54:37.034" v="1136" actId="5736"/>
           <ac:spMkLst>
             <pc:docMk/>
             <pc:sldMk cId="201650809" sldId="260"/>
@@ -1789,7 +1829,7 @@
           </ac:spMkLst>
         </pc:spChg>
         <pc:spChg chg="add mod">
-          <ac:chgData name="Montecino, Diego" userId="a795c42d-832a-4dce-b1d8-09bac981a9d2" providerId="ADAL" clId="{166D12EF-58EE-6C4C-9A24-99C33C59FE65}" dt="2024-11-15T18:37:53.741" v="1087" actId="5736"/>
+          <ac:chgData name="Montecino, Diego" userId="a795c42d-832a-4dce-b1d8-09bac981a9d2" providerId="ADAL" clId="{166D12EF-58EE-6C4C-9A24-99C33C59FE65}" dt="2024-11-15T20:54:37.034" v="1136" actId="5736"/>
           <ac:spMkLst>
             <pc:docMk/>
             <pc:sldMk cId="201650809" sldId="260"/>
@@ -1797,7 +1837,7 @@
           </ac:spMkLst>
         </pc:spChg>
         <pc:spChg chg="mod">
-          <ac:chgData name="Montecino, Diego" userId="a795c42d-832a-4dce-b1d8-09bac981a9d2" providerId="ADAL" clId="{166D12EF-58EE-6C4C-9A24-99C33C59FE65}" dt="2024-11-15T18:37:53.741" v="1087" actId="5736"/>
+          <ac:chgData name="Montecino, Diego" userId="a795c42d-832a-4dce-b1d8-09bac981a9d2" providerId="ADAL" clId="{166D12EF-58EE-6C4C-9A24-99C33C59FE65}" dt="2024-11-15T20:54:37.034" v="1136" actId="5736"/>
           <ac:spMkLst>
             <pc:docMk/>
             <pc:sldMk cId="201650809" sldId="260"/>
@@ -1805,7 +1845,7 @@
           </ac:spMkLst>
         </pc:spChg>
         <pc:spChg chg="add mod">
-          <ac:chgData name="Montecino, Diego" userId="a795c42d-832a-4dce-b1d8-09bac981a9d2" providerId="ADAL" clId="{166D12EF-58EE-6C4C-9A24-99C33C59FE65}" dt="2024-11-15T18:37:53.741" v="1087" actId="5736"/>
+          <ac:chgData name="Montecino, Diego" userId="a795c42d-832a-4dce-b1d8-09bac981a9d2" providerId="ADAL" clId="{166D12EF-58EE-6C4C-9A24-99C33C59FE65}" dt="2024-11-15T20:54:37.034" v="1136" actId="5736"/>
           <ac:spMkLst>
             <pc:docMk/>
             <pc:sldMk cId="201650809" sldId="260"/>
@@ -1813,7 +1853,7 @@
           </ac:spMkLst>
         </pc:spChg>
         <pc:spChg chg="add mod">
-          <ac:chgData name="Montecino, Diego" userId="a795c42d-832a-4dce-b1d8-09bac981a9d2" providerId="ADAL" clId="{166D12EF-58EE-6C4C-9A24-99C33C59FE65}" dt="2024-11-15T18:37:53.741" v="1087" actId="5736"/>
+          <ac:chgData name="Montecino, Diego" userId="a795c42d-832a-4dce-b1d8-09bac981a9d2" providerId="ADAL" clId="{166D12EF-58EE-6C4C-9A24-99C33C59FE65}" dt="2024-11-15T20:54:37.034" v="1136" actId="5736"/>
           <ac:spMkLst>
             <pc:docMk/>
             <pc:sldMk cId="201650809" sldId="260"/>
@@ -1821,7 +1861,7 @@
           </ac:spMkLst>
         </pc:spChg>
         <pc:spChg chg="add mod">
-          <ac:chgData name="Montecino, Diego" userId="a795c42d-832a-4dce-b1d8-09bac981a9d2" providerId="ADAL" clId="{166D12EF-58EE-6C4C-9A24-99C33C59FE65}" dt="2024-11-15T18:37:53.741" v="1087" actId="5736"/>
+          <ac:chgData name="Montecino, Diego" userId="a795c42d-832a-4dce-b1d8-09bac981a9d2" providerId="ADAL" clId="{166D12EF-58EE-6C4C-9A24-99C33C59FE65}" dt="2024-11-15T20:54:37.034" v="1136" actId="5736"/>
           <ac:spMkLst>
             <pc:docMk/>
             <pc:sldMk cId="201650809" sldId="260"/>
@@ -1829,15 +1869,23 @@
           </ac:spMkLst>
         </pc:spChg>
         <pc:spChg chg="add mod">
-          <ac:chgData name="Montecino, Diego" userId="a795c42d-832a-4dce-b1d8-09bac981a9d2" providerId="ADAL" clId="{166D12EF-58EE-6C4C-9A24-99C33C59FE65}" dt="2024-11-15T18:37:53.741" v="1087" actId="5736"/>
+          <ac:chgData name="Montecino, Diego" userId="a795c42d-832a-4dce-b1d8-09bac981a9d2" providerId="ADAL" clId="{166D12EF-58EE-6C4C-9A24-99C33C59FE65}" dt="2024-11-15T20:54:37.034" v="1136" actId="5736"/>
           <ac:spMkLst>
             <pc:docMk/>
             <pc:sldMk cId="201650809" sldId="260"/>
             <ac:spMk id="17" creationId="{C8A8BA5B-441F-47A3-A093-D62BBDAFDB6C}"/>
           </ac:spMkLst>
         </pc:spChg>
+        <pc:spChg chg="add mod">
+          <ac:chgData name="Montecino, Diego" userId="a795c42d-832a-4dce-b1d8-09bac981a9d2" providerId="ADAL" clId="{166D12EF-58EE-6C4C-9A24-99C33C59FE65}" dt="2024-11-15T20:54:37.034" v="1136" actId="5736"/>
+          <ac:spMkLst>
+            <pc:docMk/>
+            <pc:sldMk cId="201650809" sldId="260"/>
+            <ac:spMk id="19" creationId="{98824F6E-40B3-3EE3-5AC3-6D6C55FF4EDF}"/>
+          </ac:spMkLst>
+        </pc:spChg>
         <pc:spChg chg="mod">
-          <ac:chgData name="Montecino, Diego" userId="a795c42d-832a-4dce-b1d8-09bac981a9d2" providerId="ADAL" clId="{166D12EF-58EE-6C4C-9A24-99C33C59FE65}" dt="2024-11-15T18:37:53.741" v="1087" actId="5736"/>
+          <ac:chgData name="Montecino, Diego" userId="a795c42d-832a-4dce-b1d8-09bac981a9d2" providerId="ADAL" clId="{166D12EF-58EE-6C4C-9A24-99C33C59FE65}" dt="2024-11-15T20:54:37.034" v="1136" actId="5736"/>
           <ac:spMkLst>
             <pc:docMk/>
             <pc:sldMk cId="201650809" sldId="260"/>
@@ -1845,7 +1893,7 @@
           </ac:spMkLst>
         </pc:spChg>
         <pc:spChg chg="mod">
-          <ac:chgData name="Montecino, Diego" userId="a795c42d-832a-4dce-b1d8-09bac981a9d2" providerId="ADAL" clId="{166D12EF-58EE-6C4C-9A24-99C33C59FE65}" dt="2024-11-15T18:37:53.741" v="1087" actId="5736"/>
+          <ac:chgData name="Montecino, Diego" userId="a795c42d-832a-4dce-b1d8-09bac981a9d2" providerId="ADAL" clId="{166D12EF-58EE-6C4C-9A24-99C33C59FE65}" dt="2024-11-15T20:54:37.034" v="1136" actId="5736"/>
           <ac:spMkLst>
             <pc:docMk/>
             <pc:sldMk cId="201650809" sldId="260"/>
@@ -1853,7 +1901,7 @@
           </ac:spMkLst>
         </pc:spChg>
         <pc:spChg chg="mod">
-          <ac:chgData name="Montecino, Diego" userId="a795c42d-832a-4dce-b1d8-09bac981a9d2" providerId="ADAL" clId="{166D12EF-58EE-6C4C-9A24-99C33C59FE65}" dt="2024-11-15T18:37:53.741" v="1087" actId="5736"/>
+          <ac:chgData name="Montecino, Diego" userId="a795c42d-832a-4dce-b1d8-09bac981a9d2" providerId="ADAL" clId="{166D12EF-58EE-6C4C-9A24-99C33C59FE65}" dt="2024-11-15T20:54:37.034" v="1136" actId="5736"/>
           <ac:spMkLst>
             <pc:docMk/>
             <pc:sldMk cId="201650809" sldId="260"/>
@@ -1861,7 +1909,7 @@
           </ac:spMkLst>
         </pc:spChg>
         <pc:spChg chg="mod">
-          <ac:chgData name="Montecino, Diego" userId="a795c42d-832a-4dce-b1d8-09bac981a9d2" providerId="ADAL" clId="{166D12EF-58EE-6C4C-9A24-99C33C59FE65}" dt="2024-11-15T18:37:53.741" v="1087" actId="5736"/>
+          <ac:chgData name="Montecino, Diego" userId="a795c42d-832a-4dce-b1d8-09bac981a9d2" providerId="ADAL" clId="{166D12EF-58EE-6C4C-9A24-99C33C59FE65}" dt="2024-11-15T20:54:37.034" v="1136" actId="5736"/>
           <ac:spMkLst>
             <pc:docMk/>
             <pc:sldMk cId="201650809" sldId="260"/>
@@ -1869,7 +1917,7 @@
           </ac:spMkLst>
         </pc:spChg>
         <pc:spChg chg="mod">
-          <ac:chgData name="Montecino, Diego" userId="a795c42d-832a-4dce-b1d8-09bac981a9d2" providerId="ADAL" clId="{166D12EF-58EE-6C4C-9A24-99C33C59FE65}" dt="2024-11-15T18:37:53.741" v="1087" actId="5736"/>
+          <ac:chgData name="Montecino, Diego" userId="a795c42d-832a-4dce-b1d8-09bac981a9d2" providerId="ADAL" clId="{166D12EF-58EE-6C4C-9A24-99C33C59FE65}" dt="2024-11-15T20:54:37.034" v="1136" actId="5736"/>
           <ac:spMkLst>
             <pc:docMk/>
             <pc:sldMk cId="201650809" sldId="260"/>
@@ -1877,7 +1925,7 @@
           </ac:spMkLst>
         </pc:spChg>
         <pc:spChg chg="mod">
-          <ac:chgData name="Montecino, Diego" userId="a795c42d-832a-4dce-b1d8-09bac981a9d2" providerId="ADAL" clId="{166D12EF-58EE-6C4C-9A24-99C33C59FE65}" dt="2024-11-15T18:37:53.741" v="1087" actId="5736"/>
+          <ac:chgData name="Montecino, Diego" userId="a795c42d-832a-4dce-b1d8-09bac981a9d2" providerId="ADAL" clId="{166D12EF-58EE-6C4C-9A24-99C33C59FE65}" dt="2024-11-15T20:54:37.034" v="1136" actId="5736"/>
           <ac:spMkLst>
             <pc:docMk/>
             <pc:sldMk cId="201650809" sldId="260"/>
@@ -1885,7 +1933,7 @@
           </ac:spMkLst>
         </pc:spChg>
         <pc:spChg chg="mod">
-          <ac:chgData name="Montecino, Diego" userId="a795c42d-832a-4dce-b1d8-09bac981a9d2" providerId="ADAL" clId="{166D12EF-58EE-6C4C-9A24-99C33C59FE65}" dt="2024-11-15T18:37:53.741" v="1087" actId="5736"/>
+          <ac:chgData name="Montecino, Diego" userId="a795c42d-832a-4dce-b1d8-09bac981a9d2" providerId="ADAL" clId="{166D12EF-58EE-6C4C-9A24-99C33C59FE65}" dt="2024-11-15T20:54:37.034" v="1136" actId="5736"/>
           <ac:spMkLst>
             <pc:docMk/>
             <pc:sldMk cId="201650809" sldId="260"/>
@@ -1893,7 +1941,7 @@
           </ac:spMkLst>
         </pc:spChg>
         <pc:spChg chg="mod">
-          <ac:chgData name="Montecino, Diego" userId="a795c42d-832a-4dce-b1d8-09bac981a9d2" providerId="ADAL" clId="{166D12EF-58EE-6C4C-9A24-99C33C59FE65}" dt="2024-11-15T18:37:53.741" v="1087" actId="5736"/>
+          <ac:chgData name="Montecino, Diego" userId="a795c42d-832a-4dce-b1d8-09bac981a9d2" providerId="ADAL" clId="{166D12EF-58EE-6C4C-9A24-99C33C59FE65}" dt="2024-11-15T20:54:37.034" v="1136" actId="5736"/>
           <ac:spMkLst>
             <pc:docMk/>
             <pc:sldMk cId="201650809" sldId="260"/>
@@ -1901,7 +1949,7 @@
           </ac:spMkLst>
         </pc:spChg>
         <pc:spChg chg="mod">
-          <ac:chgData name="Montecino, Diego" userId="a795c42d-832a-4dce-b1d8-09bac981a9d2" providerId="ADAL" clId="{166D12EF-58EE-6C4C-9A24-99C33C59FE65}" dt="2024-11-15T18:37:53.741" v="1087" actId="5736"/>
+          <ac:chgData name="Montecino, Diego" userId="a795c42d-832a-4dce-b1d8-09bac981a9d2" providerId="ADAL" clId="{166D12EF-58EE-6C4C-9A24-99C33C59FE65}" dt="2024-11-15T20:54:37.034" v="1136" actId="5736"/>
           <ac:spMkLst>
             <pc:docMk/>
             <pc:sldMk cId="201650809" sldId="260"/>
@@ -1909,7 +1957,7 @@
           </ac:spMkLst>
         </pc:spChg>
         <pc:spChg chg="mod">
-          <ac:chgData name="Montecino, Diego" userId="a795c42d-832a-4dce-b1d8-09bac981a9d2" providerId="ADAL" clId="{166D12EF-58EE-6C4C-9A24-99C33C59FE65}" dt="2024-11-15T18:37:53.741" v="1087" actId="5736"/>
+          <ac:chgData name="Montecino, Diego" userId="a795c42d-832a-4dce-b1d8-09bac981a9d2" providerId="ADAL" clId="{166D12EF-58EE-6C4C-9A24-99C33C59FE65}" dt="2024-11-15T20:54:37.034" v="1136" actId="5736"/>
           <ac:spMkLst>
             <pc:docMk/>
             <pc:sldMk cId="201650809" sldId="260"/>
@@ -1917,7 +1965,7 @@
           </ac:spMkLst>
         </pc:spChg>
         <pc:spChg chg="mod">
-          <ac:chgData name="Montecino, Diego" userId="a795c42d-832a-4dce-b1d8-09bac981a9d2" providerId="ADAL" clId="{166D12EF-58EE-6C4C-9A24-99C33C59FE65}" dt="2024-11-15T18:37:53.741" v="1087" actId="5736"/>
+          <ac:chgData name="Montecino, Diego" userId="a795c42d-832a-4dce-b1d8-09bac981a9d2" providerId="ADAL" clId="{166D12EF-58EE-6C4C-9A24-99C33C59FE65}" dt="2024-11-15T20:54:37.034" v="1136" actId="5736"/>
           <ac:spMkLst>
             <pc:docMk/>
             <pc:sldMk cId="201650809" sldId="260"/>
@@ -1925,7 +1973,7 @@
           </ac:spMkLst>
         </pc:spChg>
         <pc:spChg chg="mod">
-          <ac:chgData name="Montecino, Diego" userId="a795c42d-832a-4dce-b1d8-09bac981a9d2" providerId="ADAL" clId="{166D12EF-58EE-6C4C-9A24-99C33C59FE65}" dt="2024-11-15T18:37:53.741" v="1087" actId="5736"/>
+          <ac:chgData name="Montecino, Diego" userId="a795c42d-832a-4dce-b1d8-09bac981a9d2" providerId="ADAL" clId="{166D12EF-58EE-6C4C-9A24-99C33C59FE65}" dt="2024-11-15T20:54:37.034" v="1136" actId="5736"/>
           <ac:spMkLst>
             <pc:docMk/>
             <pc:sldMk cId="201650809" sldId="260"/>
@@ -1933,7 +1981,7 @@
           </ac:spMkLst>
         </pc:spChg>
         <pc:spChg chg="mod">
-          <ac:chgData name="Montecino, Diego" userId="a795c42d-832a-4dce-b1d8-09bac981a9d2" providerId="ADAL" clId="{166D12EF-58EE-6C4C-9A24-99C33C59FE65}" dt="2024-11-15T18:37:53.741" v="1087" actId="5736"/>
+          <ac:chgData name="Montecino, Diego" userId="a795c42d-832a-4dce-b1d8-09bac981a9d2" providerId="ADAL" clId="{166D12EF-58EE-6C4C-9A24-99C33C59FE65}" dt="2024-11-15T20:54:37.034" v="1136" actId="5736"/>
           <ac:spMkLst>
             <pc:docMk/>
             <pc:sldMk cId="201650809" sldId="260"/>
@@ -1941,7 +1989,7 @@
           </ac:spMkLst>
         </pc:spChg>
         <pc:spChg chg="mod">
-          <ac:chgData name="Montecino, Diego" userId="a795c42d-832a-4dce-b1d8-09bac981a9d2" providerId="ADAL" clId="{166D12EF-58EE-6C4C-9A24-99C33C59FE65}" dt="2024-11-15T18:37:53.741" v="1087" actId="5736"/>
+          <ac:chgData name="Montecino, Diego" userId="a795c42d-832a-4dce-b1d8-09bac981a9d2" providerId="ADAL" clId="{166D12EF-58EE-6C4C-9A24-99C33C59FE65}" dt="2024-11-15T20:54:37.034" v="1136" actId="5736"/>
           <ac:spMkLst>
             <pc:docMk/>
             <pc:sldMk cId="201650809" sldId="260"/>
@@ -1949,7 +1997,7 @@
           </ac:spMkLst>
         </pc:spChg>
         <pc:spChg chg="mod">
-          <ac:chgData name="Montecino, Diego" userId="a795c42d-832a-4dce-b1d8-09bac981a9d2" providerId="ADAL" clId="{166D12EF-58EE-6C4C-9A24-99C33C59FE65}" dt="2024-11-15T18:37:53.741" v="1087" actId="5736"/>
+          <ac:chgData name="Montecino, Diego" userId="a795c42d-832a-4dce-b1d8-09bac981a9d2" providerId="ADAL" clId="{166D12EF-58EE-6C4C-9A24-99C33C59FE65}" dt="2024-11-15T20:54:37.034" v="1136" actId="5736"/>
           <ac:spMkLst>
             <pc:docMk/>
             <pc:sldMk cId="201650809" sldId="260"/>
@@ -1957,7 +2005,7 @@
           </ac:spMkLst>
         </pc:spChg>
         <pc:spChg chg="mod">
-          <ac:chgData name="Montecino, Diego" userId="a795c42d-832a-4dce-b1d8-09bac981a9d2" providerId="ADAL" clId="{166D12EF-58EE-6C4C-9A24-99C33C59FE65}" dt="2024-11-15T18:37:53.741" v="1087" actId="5736"/>
+          <ac:chgData name="Montecino, Diego" userId="a795c42d-832a-4dce-b1d8-09bac981a9d2" providerId="ADAL" clId="{166D12EF-58EE-6C4C-9A24-99C33C59FE65}" dt="2024-11-15T20:54:37.034" v="1136" actId="5736"/>
           <ac:spMkLst>
             <pc:docMk/>
             <pc:sldMk cId="201650809" sldId="260"/>
@@ -1965,7 +2013,7 @@
           </ac:spMkLst>
         </pc:spChg>
         <pc:spChg chg="mod">
-          <ac:chgData name="Montecino, Diego" userId="a795c42d-832a-4dce-b1d8-09bac981a9d2" providerId="ADAL" clId="{166D12EF-58EE-6C4C-9A24-99C33C59FE65}" dt="2024-11-15T18:37:53.741" v="1087" actId="5736"/>
+          <ac:chgData name="Montecino, Diego" userId="a795c42d-832a-4dce-b1d8-09bac981a9d2" providerId="ADAL" clId="{166D12EF-58EE-6C4C-9A24-99C33C59FE65}" dt="2024-11-15T20:54:37.034" v="1136" actId="5736"/>
           <ac:spMkLst>
             <pc:docMk/>
             <pc:sldMk cId="201650809" sldId="260"/>
@@ -1973,7 +2021,7 @@
           </ac:spMkLst>
         </pc:spChg>
         <pc:grpChg chg="mod">
-          <ac:chgData name="Montecino, Diego" userId="a795c42d-832a-4dce-b1d8-09bac981a9d2" providerId="ADAL" clId="{166D12EF-58EE-6C4C-9A24-99C33C59FE65}" dt="2024-11-15T18:37:53.741" v="1087" actId="5736"/>
+          <ac:chgData name="Montecino, Diego" userId="a795c42d-832a-4dce-b1d8-09bac981a9d2" providerId="ADAL" clId="{166D12EF-58EE-6C4C-9A24-99C33C59FE65}" dt="2024-11-15T20:54:37.034" v="1136" actId="5736"/>
           <ac:grpSpMkLst>
             <pc:docMk/>
             <pc:sldMk cId="201650809" sldId="260"/>
@@ -1981,7 +2029,7 @@
           </ac:grpSpMkLst>
         </pc:grpChg>
         <pc:grpChg chg="mod">
-          <ac:chgData name="Montecino, Diego" userId="a795c42d-832a-4dce-b1d8-09bac981a9d2" providerId="ADAL" clId="{166D12EF-58EE-6C4C-9A24-99C33C59FE65}" dt="2024-11-15T18:37:53.741" v="1087" actId="5736"/>
+          <ac:chgData name="Montecino, Diego" userId="a795c42d-832a-4dce-b1d8-09bac981a9d2" providerId="ADAL" clId="{166D12EF-58EE-6C4C-9A24-99C33C59FE65}" dt="2024-11-15T20:54:37.034" v="1136" actId="5736"/>
           <ac:grpSpMkLst>
             <pc:docMk/>
             <pc:sldMk cId="201650809" sldId="260"/>
@@ -1989,7 +2037,7 @@
           </ac:grpSpMkLst>
         </pc:grpChg>
         <pc:graphicFrameChg chg="mod">
-          <ac:chgData name="Montecino, Diego" userId="a795c42d-832a-4dce-b1d8-09bac981a9d2" providerId="ADAL" clId="{166D12EF-58EE-6C4C-9A24-99C33C59FE65}" dt="2024-11-15T18:37:53.741" v="1087" actId="5736"/>
+          <ac:chgData name="Montecino, Diego" userId="a795c42d-832a-4dce-b1d8-09bac981a9d2" providerId="ADAL" clId="{166D12EF-58EE-6C4C-9A24-99C33C59FE65}" dt="2024-11-15T20:54:37.034" v="1136" actId="5736"/>
           <ac:graphicFrameMkLst>
             <pc:docMk/>
             <pc:sldMk cId="201650809" sldId="260"/>
@@ -2013,7 +2061,7 @@
           </ac:cxnSpMkLst>
         </pc:cxnChg>
         <pc:cxnChg chg="add mod">
-          <ac:chgData name="Montecino, Diego" userId="a795c42d-832a-4dce-b1d8-09bac981a9d2" providerId="ADAL" clId="{166D12EF-58EE-6C4C-9A24-99C33C59FE65}" dt="2024-11-15T18:37:53.741" v="1087" actId="5736"/>
+          <ac:chgData name="Montecino, Diego" userId="a795c42d-832a-4dce-b1d8-09bac981a9d2" providerId="ADAL" clId="{166D12EF-58EE-6C4C-9A24-99C33C59FE65}" dt="2024-11-15T20:54:37.034" v="1136" actId="5736"/>
           <ac:cxnSpMkLst>
             <pc:docMk/>
             <pc:sldMk cId="201650809" sldId="260"/>
@@ -2021,7 +2069,7 @@
           </ac:cxnSpMkLst>
         </pc:cxnChg>
         <pc:cxnChg chg="add mod">
-          <ac:chgData name="Montecino, Diego" userId="a795c42d-832a-4dce-b1d8-09bac981a9d2" providerId="ADAL" clId="{166D12EF-58EE-6C4C-9A24-99C33C59FE65}" dt="2024-11-15T18:37:53.741" v="1087" actId="5736"/>
+          <ac:chgData name="Montecino, Diego" userId="a795c42d-832a-4dce-b1d8-09bac981a9d2" providerId="ADAL" clId="{166D12EF-58EE-6C4C-9A24-99C33C59FE65}" dt="2024-11-15T20:54:37.034" v="1136" actId="5736"/>
           <ac:cxnSpMkLst>
             <pc:docMk/>
             <pc:sldMk cId="201650809" sldId="260"/>
@@ -2029,7 +2077,7 @@
           </ac:cxnSpMkLst>
         </pc:cxnChg>
         <pc:cxnChg chg="add mod">
-          <ac:chgData name="Montecino, Diego" userId="a795c42d-832a-4dce-b1d8-09bac981a9d2" providerId="ADAL" clId="{166D12EF-58EE-6C4C-9A24-99C33C59FE65}" dt="2024-11-15T18:37:53.741" v="1087" actId="5736"/>
+          <ac:chgData name="Montecino, Diego" userId="a795c42d-832a-4dce-b1d8-09bac981a9d2" providerId="ADAL" clId="{166D12EF-58EE-6C4C-9A24-99C33C59FE65}" dt="2024-11-15T20:54:37.034" v="1136" actId="5736"/>
           <ac:cxnSpMkLst>
             <pc:docMk/>
             <pc:sldMk cId="201650809" sldId="260"/>
@@ -2037,7 +2085,7 @@
           </ac:cxnSpMkLst>
         </pc:cxnChg>
         <pc:cxnChg chg="add mod">
-          <ac:chgData name="Montecino, Diego" userId="a795c42d-832a-4dce-b1d8-09bac981a9d2" providerId="ADAL" clId="{166D12EF-58EE-6C4C-9A24-99C33C59FE65}" dt="2024-11-15T18:37:53.741" v="1087" actId="5736"/>
+          <ac:chgData name="Montecino, Diego" userId="a795c42d-832a-4dce-b1d8-09bac981a9d2" providerId="ADAL" clId="{166D12EF-58EE-6C4C-9A24-99C33C59FE65}" dt="2024-11-15T20:54:37.034" v="1136" actId="5736"/>
           <ac:cxnSpMkLst>
             <pc:docMk/>
             <pc:sldMk cId="201650809" sldId="260"/>
@@ -2045,7 +2093,7 @@
           </ac:cxnSpMkLst>
         </pc:cxnChg>
         <pc:cxnChg chg="mod">
-          <ac:chgData name="Montecino, Diego" userId="a795c42d-832a-4dce-b1d8-09bac981a9d2" providerId="ADAL" clId="{166D12EF-58EE-6C4C-9A24-99C33C59FE65}" dt="2024-11-15T18:37:53.741" v="1087" actId="5736"/>
+          <ac:chgData name="Montecino, Diego" userId="a795c42d-832a-4dce-b1d8-09bac981a9d2" providerId="ADAL" clId="{166D12EF-58EE-6C4C-9A24-99C33C59FE65}" dt="2024-11-15T20:54:37.034" v="1136" actId="5736"/>
           <ac:cxnSpMkLst>
             <pc:docMk/>
             <pc:sldMk cId="201650809" sldId="260"/>
@@ -2053,7 +2101,7 @@
           </ac:cxnSpMkLst>
         </pc:cxnChg>
         <pc:cxnChg chg="add mod">
-          <ac:chgData name="Montecino, Diego" userId="a795c42d-832a-4dce-b1d8-09bac981a9d2" providerId="ADAL" clId="{166D12EF-58EE-6C4C-9A24-99C33C59FE65}" dt="2024-11-15T18:37:53.741" v="1087" actId="5736"/>
+          <ac:chgData name="Montecino, Diego" userId="a795c42d-832a-4dce-b1d8-09bac981a9d2" providerId="ADAL" clId="{166D12EF-58EE-6C4C-9A24-99C33C59FE65}" dt="2024-11-15T20:54:37.034" v="1136" actId="5736"/>
           <ac:cxnSpMkLst>
             <pc:docMk/>
             <pc:sldMk cId="201650809" sldId="260"/>
@@ -2061,7 +2109,7 @@
           </ac:cxnSpMkLst>
         </pc:cxnChg>
         <pc:cxnChg chg="add mod">
-          <ac:chgData name="Montecino, Diego" userId="a795c42d-832a-4dce-b1d8-09bac981a9d2" providerId="ADAL" clId="{166D12EF-58EE-6C4C-9A24-99C33C59FE65}" dt="2024-11-15T18:37:53.741" v="1087" actId="5736"/>
+          <ac:chgData name="Montecino, Diego" userId="a795c42d-832a-4dce-b1d8-09bac981a9d2" providerId="ADAL" clId="{166D12EF-58EE-6C4C-9A24-99C33C59FE65}" dt="2024-11-15T20:54:37.034" v="1136" actId="5736"/>
           <ac:cxnSpMkLst>
             <pc:docMk/>
             <pc:sldMk cId="201650809" sldId="260"/>
@@ -2076,8 +2124,16 @@
             <ac:cxnSpMk id="16" creationId="{89A58B1F-6C37-B3D5-A603-689B1051381B}"/>
           </ac:cxnSpMkLst>
         </pc:cxnChg>
+        <pc:cxnChg chg="add mod">
+          <ac:chgData name="Montecino, Diego" userId="a795c42d-832a-4dce-b1d8-09bac981a9d2" providerId="ADAL" clId="{166D12EF-58EE-6C4C-9A24-99C33C59FE65}" dt="2024-11-15T20:54:37.034" v="1136" actId="5736"/>
+          <ac:cxnSpMkLst>
+            <pc:docMk/>
+            <pc:sldMk cId="201650809" sldId="260"/>
+            <ac:cxnSpMk id="18" creationId="{9BB3121E-15B7-ACAA-620E-C516C58F4A14}"/>
+          </ac:cxnSpMkLst>
+        </pc:cxnChg>
         <pc:cxnChg chg="mod">
-          <ac:chgData name="Montecino, Diego" userId="a795c42d-832a-4dce-b1d8-09bac981a9d2" providerId="ADAL" clId="{166D12EF-58EE-6C4C-9A24-99C33C59FE65}" dt="2024-11-15T18:37:53.741" v="1087" actId="5736"/>
+          <ac:chgData name="Montecino, Diego" userId="a795c42d-832a-4dce-b1d8-09bac981a9d2" providerId="ADAL" clId="{166D12EF-58EE-6C4C-9A24-99C33C59FE65}" dt="2024-11-15T20:54:37.034" v="1136" actId="5736"/>
           <ac:cxnSpMkLst>
             <pc:docMk/>
             <pc:sldMk cId="201650809" sldId="260"/>
@@ -2085,7 +2141,7 @@
           </ac:cxnSpMkLst>
         </pc:cxnChg>
         <pc:cxnChg chg="mod">
-          <ac:chgData name="Montecino, Diego" userId="a795c42d-832a-4dce-b1d8-09bac981a9d2" providerId="ADAL" clId="{166D12EF-58EE-6C4C-9A24-99C33C59FE65}" dt="2024-11-15T18:37:53.741" v="1087" actId="5736"/>
+          <ac:chgData name="Montecino, Diego" userId="a795c42d-832a-4dce-b1d8-09bac981a9d2" providerId="ADAL" clId="{166D12EF-58EE-6C4C-9A24-99C33C59FE65}" dt="2024-11-15T20:54:37.034" v="1136" actId="5736"/>
           <ac:cxnSpMkLst>
             <pc:docMk/>
             <pc:sldMk cId="201650809" sldId="260"/>
@@ -2093,7 +2149,7 @@
           </ac:cxnSpMkLst>
         </pc:cxnChg>
         <pc:cxnChg chg="mod">
-          <ac:chgData name="Montecino, Diego" userId="a795c42d-832a-4dce-b1d8-09bac981a9d2" providerId="ADAL" clId="{166D12EF-58EE-6C4C-9A24-99C33C59FE65}" dt="2024-11-15T18:37:53.741" v="1087" actId="5736"/>
+          <ac:chgData name="Montecino, Diego" userId="a795c42d-832a-4dce-b1d8-09bac981a9d2" providerId="ADAL" clId="{166D12EF-58EE-6C4C-9A24-99C33C59FE65}" dt="2024-11-15T20:54:37.034" v="1136" actId="5736"/>
           <ac:cxnSpMkLst>
             <pc:docMk/>
             <pc:sldMk cId="201650809" sldId="260"/>
@@ -2101,7 +2157,7 @@
           </ac:cxnSpMkLst>
         </pc:cxnChg>
         <pc:cxnChg chg="mod">
-          <ac:chgData name="Montecino, Diego" userId="a795c42d-832a-4dce-b1d8-09bac981a9d2" providerId="ADAL" clId="{166D12EF-58EE-6C4C-9A24-99C33C59FE65}" dt="2024-11-15T18:37:53.741" v="1087" actId="5736"/>
+          <ac:chgData name="Montecino, Diego" userId="a795c42d-832a-4dce-b1d8-09bac981a9d2" providerId="ADAL" clId="{166D12EF-58EE-6C4C-9A24-99C33C59FE65}" dt="2024-11-15T20:54:37.034" v="1136" actId="5736"/>
           <ac:cxnSpMkLst>
             <pc:docMk/>
             <pc:sldMk cId="201650809" sldId="260"/>
@@ -2109,7 +2165,7 @@
           </ac:cxnSpMkLst>
         </pc:cxnChg>
         <pc:cxnChg chg="mod">
-          <ac:chgData name="Montecino, Diego" userId="a795c42d-832a-4dce-b1d8-09bac981a9d2" providerId="ADAL" clId="{166D12EF-58EE-6C4C-9A24-99C33C59FE65}" dt="2024-11-15T18:37:53.741" v="1087" actId="5736"/>
+          <ac:chgData name="Montecino, Diego" userId="a795c42d-832a-4dce-b1d8-09bac981a9d2" providerId="ADAL" clId="{166D12EF-58EE-6C4C-9A24-99C33C59FE65}" dt="2024-11-15T20:54:37.034" v="1136" actId="5736"/>
           <ac:cxnSpMkLst>
             <pc:docMk/>
             <pc:sldMk cId="201650809" sldId="260"/>
@@ -2117,7 +2173,7 @@
           </ac:cxnSpMkLst>
         </pc:cxnChg>
         <pc:cxnChg chg="mod">
-          <ac:chgData name="Montecino, Diego" userId="a795c42d-832a-4dce-b1d8-09bac981a9d2" providerId="ADAL" clId="{166D12EF-58EE-6C4C-9A24-99C33C59FE65}" dt="2024-11-15T18:37:53.741" v="1087" actId="5736"/>
+          <ac:chgData name="Montecino, Diego" userId="a795c42d-832a-4dce-b1d8-09bac981a9d2" providerId="ADAL" clId="{166D12EF-58EE-6C4C-9A24-99C33C59FE65}" dt="2024-11-15T20:54:37.034" v="1136" actId="5736"/>
           <ac:cxnSpMkLst>
             <pc:docMk/>
             <pc:sldMk cId="201650809" sldId="260"/>
@@ -2125,7 +2181,7 @@
           </ac:cxnSpMkLst>
         </pc:cxnChg>
         <pc:cxnChg chg="mod">
-          <ac:chgData name="Montecino, Diego" userId="a795c42d-832a-4dce-b1d8-09bac981a9d2" providerId="ADAL" clId="{166D12EF-58EE-6C4C-9A24-99C33C59FE65}" dt="2024-11-15T18:37:53.741" v="1087" actId="5736"/>
+          <ac:chgData name="Montecino, Diego" userId="a795c42d-832a-4dce-b1d8-09bac981a9d2" providerId="ADAL" clId="{166D12EF-58EE-6C4C-9A24-99C33C59FE65}" dt="2024-11-15T20:54:37.034" v="1136" actId="5736"/>
           <ac:cxnSpMkLst>
             <pc:docMk/>
             <pc:sldMk cId="201650809" sldId="260"/>
@@ -2133,7 +2189,7 @@
           </ac:cxnSpMkLst>
         </pc:cxnChg>
         <pc:cxnChg chg="mod">
-          <ac:chgData name="Montecino, Diego" userId="a795c42d-832a-4dce-b1d8-09bac981a9d2" providerId="ADAL" clId="{166D12EF-58EE-6C4C-9A24-99C33C59FE65}" dt="2024-11-15T18:37:53.741" v="1087" actId="5736"/>
+          <ac:chgData name="Montecino, Diego" userId="a795c42d-832a-4dce-b1d8-09bac981a9d2" providerId="ADAL" clId="{166D12EF-58EE-6C4C-9A24-99C33C59FE65}" dt="2024-11-15T20:54:37.034" v="1136" actId="5736"/>
           <ac:cxnSpMkLst>
             <pc:docMk/>
             <pc:sldMk cId="201650809" sldId="260"/>
@@ -2141,7 +2197,7 @@
           </ac:cxnSpMkLst>
         </pc:cxnChg>
         <pc:cxnChg chg="mod">
-          <ac:chgData name="Montecino, Diego" userId="a795c42d-832a-4dce-b1d8-09bac981a9d2" providerId="ADAL" clId="{166D12EF-58EE-6C4C-9A24-99C33C59FE65}" dt="2024-11-15T18:37:53.741" v="1087" actId="5736"/>
+          <ac:chgData name="Montecino, Diego" userId="a795c42d-832a-4dce-b1d8-09bac981a9d2" providerId="ADAL" clId="{166D12EF-58EE-6C4C-9A24-99C33C59FE65}" dt="2024-11-15T20:54:37.034" v="1136" actId="5736"/>
           <ac:cxnSpMkLst>
             <pc:docMk/>
             <pc:sldMk cId="201650809" sldId="260"/>
@@ -2149,7 +2205,7 @@
           </ac:cxnSpMkLst>
         </pc:cxnChg>
         <pc:cxnChg chg="mod">
-          <ac:chgData name="Montecino, Diego" userId="a795c42d-832a-4dce-b1d8-09bac981a9d2" providerId="ADAL" clId="{166D12EF-58EE-6C4C-9A24-99C33C59FE65}" dt="2024-11-15T18:37:53.741" v="1087" actId="5736"/>
+          <ac:chgData name="Montecino, Diego" userId="a795c42d-832a-4dce-b1d8-09bac981a9d2" providerId="ADAL" clId="{166D12EF-58EE-6C4C-9A24-99C33C59FE65}" dt="2024-11-15T20:54:37.034" v="1136" actId="5736"/>
           <ac:cxnSpMkLst>
             <pc:docMk/>
             <pc:sldMk cId="201650809" sldId="260"/>
@@ -2157,7 +2213,7 @@
           </ac:cxnSpMkLst>
         </pc:cxnChg>
         <pc:cxnChg chg="mod">
-          <ac:chgData name="Montecino, Diego" userId="a795c42d-832a-4dce-b1d8-09bac981a9d2" providerId="ADAL" clId="{166D12EF-58EE-6C4C-9A24-99C33C59FE65}" dt="2024-11-15T18:37:53.741" v="1087" actId="5736"/>
+          <ac:chgData name="Montecino, Diego" userId="a795c42d-832a-4dce-b1d8-09bac981a9d2" providerId="ADAL" clId="{166D12EF-58EE-6C4C-9A24-99C33C59FE65}" dt="2024-11-15T20:54:37.034" v="1136" actId="5736"/>
           <ac:cxnSpMkLst>
             <pc:docMk/>
             <pc:sldMk cId="201650809" sldId="260"/>
@@ -2165,7 +2221,7 @@
           </ac:cxnSpMkLst>
         </pc:cxnChg>
         <pc:cxnChg chg="mod">
-          <ac:chgData name="Montecino, Diego" userId="a795c42d-832a-4dce-b1d8-09bac981a9d2" providerId="ADAL" clId="{166D12EF-58EE-6C4C-9A24-99C33C59FE65}" dt="2024-11-15T18:37:53.741" v="1087" actId="5736"/>
+          <ac:chgData name="Montecino, Diego" userId="a795c42d-832a-4dce-b1d8-09bac981a9d2" providerId="ADAL" clId="{166D12EF-58EE-6C4C-9A24-99C33C59FE65}" dt="2024-11-15T20:54:37.034" v="1136" actId="5736"/>
           <ac:cxnSpMkLst>
             <pc:docMk/>
             <pc:sldMk cId="201650809" sldId="260"/>
@@ -2173,7 +2229,7 @@
           </ac:cxnSpMkLst>
         </pc:cxnChg>
         <pc:cxnChg chg="mod">
-          <ac:chgData name="Montecino, Diego" userId="a795c42d-832a-4dce-b1d8-09bac981a9d2" providerId="ADAL" clId="{166D12EF-58EE-6C4C-9A24-99C33C59FE65}" dt="2024-11-15T18:37:53.741" v="1087" actId="5736"/>
+          <ac:chgData name="Montecino, Diego" userId="a795c42d-832a-4dce-b1d8-09bac981a9d2" providerId="ADAL" clId="{166D12EF-58EE-6C4C-9A24-99C33C59FE65}" dt="2024-11-15T20:54:37.034" v="1136" actId="5736"/>
           <ac:cxnSpMkLst>
             <pc:docMk/>
             <pc:sldMk cId="201650809" sldId="260"/>
@@ -2181,7 +2237,7 @@
           </ac:cxnSpMkLst>
         </pc:cxnChg>
         <pc:cxnChg chg="mod">
-          <ac:chgData name="Montecino, Diego" userId="a795c42d-832a-4dce-b1d8-09bac981a9d2" providerId="ADAL" clId="{166D12EF-58EE-6C4C-9A24-99C33C59FE65}" dt="2024-11-15T18:37:53.741" v="1087" actId="5736"/>
+          <ac:chgData name="Montecino, Diego" userId="a795c42d-832a-4dce-b1d8-09bac981a9d2" providerId="ADAL" clId="{166D12EF-58EE-6C4C-9A24-99C33C59FE65}" dt="2024-11-15T20:54:37.034" v="1136" actId="5736"/>
           <ac:cxnSpMkLst>
             <pc:docMk/>
             <pc:sldMk cId="201650809" sldId="260"/>
@@ -2189,7 +2245,7 @@
           </ac:cxnSpMkLst>
         </pc:cxnChg>
         <pc:cxnChg chg="mod">
-          <ac:chgData name="Montecino, Diego" userId="a795c42d-832a-4dce-b1d8-09bac981a9d2" providerId="ADAL" clId="{166D12EF-58EE-6C4C-9A24-99C33C59FE65}" dt="2024-11-15T18:37:53.741" v="1087" actId="5736"/>
+          <ac:chgData name="Montecino, Diego" userId="a795c42d-832a-4dce-b1d8-09bac981a9d2" providerId="ADAL" clId="{166D12EF-58EE-6C4C-9A24-99C33C59FE65}" dt="2024-11-15T20:54:37.034" v="1136" actId="5736"/>
           <ac:cxnSpMkLst>
             <pc:docMk/>
             <pc:sldMk cId="201650809" sldId="260"/>
@@ -2197,7 +2253,7 @@
           </ac:cxnSpMkLst>
         </pc:cxnChg>
         <pc:cxnChg chg="mod">
-          <ac:chgData name="Montecino, Diego" userId="a795c42d-832a-4dce-b1d8-09bac981a9d2" providerId="ADAL" clId="{166D12EF-58EE-6C4C-9A24-99C33C59FE65}" dt="2024-11-15T18:37:53.741" v="1087" actId="5736"/>
+          <ac:chgData name="Montecino, Diego" userId="a795c42d-832a-4dce-b1d8-09bac981a9d2" providerId="ADAL" clId="{166D12EF-58EE-6C4C-9A24-99C33C59FE65}" dt="2024-11-15T20:54:37.034" v="1136" actId="5736"/>
           <ac:cxnSpMkLst>
             <pc:docMk/>
             <pc:sldMk cId="201650809" sldId="260"/>
@@ -2205,7 +2261,7 @@
           </ac:cxnSpMkLst>
         </pc:cxnChg>
         <pc:cxnChg chg="mod">
-          <ac:chgData name="Montecino, Diego" userId="a795c42d-832a-4dce-b1d8-09bac981a9d2" providerId="ADAL" clId="{166D12EF-58EE-6C4C-9A24-99C33C59FE65}" dt="2024-11-15T18:37:53.741" v="1087" actId="5736"/>
+          <ac:chgData name="Montecino, Diego" userId="a795c42d-832a-4dce-b1d8-09bac981a9d2" providerId="ADAL" clId="{166D12EF-58EE-6C4C-9A24-99C33C59FE65}" dt="2024-11-15T20:54:37.034" v="1136" actId="5736"/>
           <ac:cxnSpMkLst>
             <pc:docMk/>
             <pc:sldMk cId="201650809" sldId="260"/>
@@ -2213,7 +2269,7 @@
           </ac:cxnSpMkLst>
         </pc:cxnChg>
         <pc:cxnChg chg="mod">
-          <ac:chgData name="Montecino, Diego" userId="a795c42d-832a-4dce-b1d8-09bac981a9d2" providerId="ADAL" clId="{166D12EF-58EE-6C4C-9A24-99C33C59FE65}" dt="2024-11-15T18:37:53.741" v="1087" actId="5736"/>
+          <ac:chgData name="Montecino, Diego" userId="a795c42d-832a-4dce-b1d8-09bac981a9d2" providerId="ADAL" clId="{166D12EF-58EE-6C4C-9A24-99C33C59FE65}" dt="2024-11-15T20:54:37.034" v="1136" actId="5736"/>
           <ac:cxnSpMkLst>
             <pc:docMk/>
             <pc:sldMk cId="201650809" sldId="260"/>
@@ -2221,7 +2277,7 @@
           </ac:cxnSpMkLst>
         </pc:cxnChg>
         <pc:cxnChg chg="mod">
-          <ac:chgData name="Montecino, Diego" userId="a795c42d-832a-4dce-b1d8-09bac981a9d2" providerId="ADAL" clId="{166D12EF-58EE-6C4C-9A24-99C33C59FE65}" dt="2024-11-15T18:37:53.741" v="1087" actId="5736"/>
+          <ac:chgData name="Montecino, Diego" userId="a795c42d-832a-4dce-b1d8-09bac981a9d2" providerId="ADAL" clId="{166D12EF-58EE-6C4C-9A24-99C33C59FE65}" dt="2024-11-15T20:54:37.034" v="1136" actId="5736"/>
           <ac:cxnSpMkLst>
             <pc:docMk/>
             <pc:sldMk cId="201650809" sldId="260"/>
@@ -2229,7 +2285,7 @@
           </ac:cxnSpMkLst>
         </pc:cxnChg>
         <pc:cxnChg chg="mod">
-          <ac:chgData name="Montecino, Diego" userId="a795c42d-832a-4dce-b1d8-09bac981a9d2" providerId="ADAL" clId="{166D12EF-58EE-6C4C-9A24-99C33C59FE65}" dt="2024-11-15T18:37:53.741" v="1087" actId="5736"/>
+          <ac:chgData name="Montecino, Diego" userId="a795c42d-832a-4dce-b1d8-09bac981a9d2" providerId="ADAL" clId="{166D12EF-58EE-6C4C-9A24-99C33C59FE65}" dt="2024-11-15T20:54:37.034" v="1136" actId="5736"/>
           <ac:cxnSpMkLst>
             <pc:docMk/>
             <pc:sldMk cId="201650809" sldId="260"/>
@@ -2237,7 +2293,7 @@
           </ac:cxnSpMkLst>
         </pc:cxnChg>
         <pc:cxnChg chg="mod">
-          <ac:chgData name="Montecino, Diego" userId="a795c42d-832a-4dce-b1d8-09bac981a9d2" providerId="ADAL" clId="{166D12EF-58EE-6C4C-9A24-99C33C59FE65}" dt="2024-11-15T18:37:53.741" v="1087" actId="5736"/>
+          <ac:chgData name="Montecino, Diego" userId="a795c42d-832a-4dce-b1d8-09bac981a9d2" providerId="ADAL" clId="{166D12EF-58EE-6C4C-9A24-99C33C59FE65}" dt="2024-11-15T20:54:37.034" v="1136" actId="5736"/>
           <ac:cxnSpMkLst>
             <pc:docMk/>
             <pc:sldMk cId="201650809" sldId="260"/>
@@ -20909,6 +20965,34 @@
           <a:chExt cx="0" cy="0"/>
         </a:xfrm>
       </p:grpSpPr>
+      <p:graphicFrame>
+        <p:nvGraphicFramePr>
+          <p:cNvPr id="9" name="Diagram 8">
+            <a:extLst>
+              <a:ext uri="{FF2B5EF4-FFF2-40B4-BE49-F238E27FC236}">
+                <a16:creationId xmlns:a16="http://schemas.microsoft.com/office/drawing/2014/main" id="{2F18DD03-8D72-10E9-0FC9-89D6DEF372D4}"/>
+              </a:ext>
+            </a:extLst>
+          </p:cNvPr>
+          <p:cNvGraphicFramePr/>
+          <p:nvPr>
+            <p:extLst>
+              <p:ext uri="{D42A27DB-BD31-4B8C-83A1-F6EECF244321}">
+                <p14:modId xmlns:p14="http://schemas.microsoft.com/office/powerpoint/2010/main" val="3848927397"/>
+              </p:ext>
+            </p:extLst>
+          </p:nvPr>
+        </p:nvGraphicFramePr>
+        <p:xfrm>
+          <a:off x="-169055" y="160255"/>
+          <a:ext cx="9839644" cy="6537490"/>
+        </p:xfrm>
+        <a:graphic>
+          <a:graphicData uri="http://schemas.openxmlformats.org/drawingml/2006/diagram">
+            <dgm:relIds xmlns:dgm="http://schemas.openxmlformats.org/drawingml/2006/diagram" xmlns:r="http://schemas.openxmlformats.org/officeDocument/2006/relationships" r:dm="rId2" r:lo="rId3" r:qs="rId4" r:cs="rId5"/>
+          </a:graphicData>
+        </a:graphic>
+      </p:graphicFrame>
       <p:cxnSp>
         <p:nvCxnSpPr>
           <p:cNvPr id="30" name="Straight Connector 29">
@@ -23854,34 +23938,82 @@
           </a:p>
         </p:txBody>
       </p:sp>
-      <p:graphicFrame>
-        <p:nvGraphicFramePr>
-          <p:cNvPr id="9" name="Diagram 8">
+      <p:cxnSp>
+        <p:nvCxnSpPr>
+          <p:cNvPr id="60" name="Straight Connector 59">
             <a:extLst>
               <a:ext uri="{FF2B5EF4-FFF2-40B4-BE49-F238E27FC236}">
-                <a16:creationId xmlns:a16="http://schemas.microsoft.com/office/drawing/2014/main" id="{2F18DD03-8D72-10E9-0FC9-89D6DEF372D4}"/>
+                <a16:creationId xmlns:a16="http://schemas.microsoft.com/office/drawing/2014/main" id="{835A9BCB-7D48-3524-EEFF-32DB9B802ABC}"/>
               </a:ext>
             </a:extLst>
           </p:cNvPr>
-          <p:cNvGraphicFramePr/>
-          <p:nvPr>
-            <p:extLst>
-              <p:ext uri="{D42A27DB-BD31-4B8C-83A1-F6EECF244321}">
-                <p14:modId xmlns:p14="http://schemas.microsoft.com/office/powerpoint/2010/main" val="1994942336"/>
-              </p:ext>
-            </p:extLst>
-          </p:nvPr>
-        </p:nvGraphicFramePr>
-        <p:xfrm>
-          <a:off x="-169055" y="160255"/>
-          <a:ext cx="9839644" cy="6537490"/>
-        </p:xfrm>
-        <a:graphic>
-          <a:graphicData uri="http://schemas.openxmlformats.org/drawingml/2006/diagram">
-            <dgm:relIds xmlns:dgm="http://schemas.openxmlformats.org/drawingml/2006/diagram" xmlns:r="http://schemas.openxmlformats.org/officeDocument/2006/relationships" r:dm="rId2" r:lo="rId3" r:qs="rId4" r:cs="rId5"/>
-          </a:graphicData>
-        </a:graphic>
-      </p:graphicFrame>
+          <p:cNvCxnSpPr>
+            <a:cxnSpLocks/>
+          </p:cNvCxnSpPr>
+          <p:nvPr/>
+        </p:nvCxnSpPr>
+        <p:spPr>
+          <a:xfrm flipV="1">
+            <a:off x="4279073" y="5939158"/>
+            <a:ext cx="0" cy="378414"/>
+          </a:xfrm>
+          <a:prstGeom prst="line">
+            <a:avLst/>
+          </a:prstGeom>
+          <a:ln>
+            <a:prstDash val="sysDash"/>
+          </a:ln>
+        </p:spPr>
+        <p:style>
+          <a:lnRef idx="2">
+            <a:schemeClr val="accent1"/>
+          </a:lnRef>
+          <a:fillRef idx="0">
+            <a:schemeClr val="accent1"/>
+          </a:fillRef>
+          <a:effectRef idx="1">
+            <a:schemeClr val="accent1"/>
+          </a:effectRef>
+          <a:fontRef idx="minor">
+            <a:schemeClr val="tx1"/>
+          </a:fontRef>
+        </p:style>
+      </p:cxnSp>
+      <p:sp>
+        <p:nvSpPr>
+          <p:cNvPr id="63" name="TextBox 62">
+            <a:extLst>
+              <a:ext uri="{FF2B5EF4-FFF2-40B4-BE49-F238E27FC236}">
+                <a16:creationId xmlns:a16="http://schemas.microsoft.com/office/drawing/2014/main" id="{03F25ECE-0F68-B601-6658-CB4EE9EF98F1}"/>
+              </a:ext>
+            </a:extLst>
+          </p:cNvPr>
+          <p:cNvSpPr txBox="1"/>
+          <p:nvPr/>
+        </p:nvSpPr>
+        <p:spPr>
+          <a:xfrm>
+            <a:off x="4343861" y="5979945"/>
+            <a:ext cx="579407" cy="215444"/>
+          </a:xfrm>
+          <a:prstGeom prst="rect">
+            <a:avLst/>
+          </a:prstGeom>
+          <a:noFill/>
+        </p:spPr>
+        <p:txBody>
+          <a:bodyPr wrap="square" rtlCol="0">
+            <a:spAutoFit/>
+          </a:bodyPr>
+          <a:lstStyle/>
+          <a:p>
+            <a:r>
+              <a:rPr lang="en-US" sz="800" dirty="0"/>
+              <a:t>1:M</a:t>
+            </a:r>
+          </a:p>
+        </p:txBody>
+      </p:sp>
     </p:spTree>
     <p:extLst>
       <p:ext uri="{BB962C8B-B14F-4D97-AF65-F5344CB8AC3E}">
@@ -26265,7 +26397,7 @@
           <p:nvPr>
             <p:extLst>
               <p:ext uri="{D42A27DB-BD31-4B8C-83A1-F6EECF244321}">
-                <p14:modId xmlns:p14="http://schemas.microsoft.com/office/powerpoint/2010/main" val="794569645"/>
+                <p14:modId xmlns:p14="http://schemas.microsoft.com/office/powerpoint/2010/main" val="1068895895"/>
               </p:ext>
             </p:extLst>
           </p:nvPr>
@@ -26280,6 +26412,82 @@
           </a:graphicData>
         </a:graphic>
       </p:graphicFrame>
+      <p:cxnSp>
+        <p:nvCxnSpPr>
+          <p:cNvPr id="19" name="Straight Connector 18">
+            <a:extLst>
+              <a:ext uri="{FF2B5EF4-FFF2-40B4-BE49-F238E27FC236}">
+                <a16:creationId xmlns:a16="http://schemas.microsoft.com/office/drawing/2014/main" id="{68CD4F76-3504-822F-3A5A-BD04683782BF}"/>
+              </a:ext>
+            </a:extLst>
+          </p:cNvPr>
+          <p:cNvCxnSpPr>
+            <a:cxnSpLocks/>
+          </p:cNvCxnSpPr>
+          <p:nvPr/>
+        </p:nvCxnSpPr>
+        <p:spPr>
+          <a:xfrm flipV="1">
+            <a:off x="4036461" y="6046008"/>
+            <a:ext cx="0" cy="378414"/>
+          </a:xfrm>
+          <a:prstGeom prst="line">
+            <a:avLst/>
+          </a:prstGeom>
+          <a:ln>
+            <a:prstDash val="sysDash"/>
+          </a:ln>
+        </p:spPr>
+        <p:style>
+          <a:lnRef idx="2">
+            <a:schemeClr val="accent1"/>
+          </a:lnRef>
+          <a:fillRef idx="0">
+            <a:schemeClr val="accent1"/>
+          </a:fillRef>
+          <a:effectRef idx="1">
+            <a:schemeClr val="accent1"/>
+          </a:effectRef>
+          <a:fontRef idx="minor">
+            <a:schemeClr val="tx1"/>
+          </a:fontRef>
+        </p:style>
+      </p:cxnSp>
+      <p:sp>
+        <p:nvSpPr>
+          <p:cNvPr id="20" name="TextBox 19">
+            <a:extLst>
+              <a:ext uri="{FF2B5EF4-FFF2-40B4-BE49-F238E27FC236}">
+                <a16:creationId xmlns:a16="http://schemas.microsoft.com/office/drawing/2014/main" id="{9E965EC0-C1AB-F7CE-1E41-334C7DC29BB5}"/>
+              </a:ext>
+            </a:extLst>
+          </p:cNvPr>
+          <p:cNvSpPr txBox="1"/>
+          <p:nvPr/>
+        </p:nvSpPr>
+        <p:spPr>
+          <a:xfrm>
+            <a:off x="4101249" y="6086795"/>
+            <a:ext cx="579407" cy="215444"/>
+          </a:xfrm>
+          <a:prstGeom prst="rect">
+            <a:avLst/>
+          </a:prstGeom>
+          <a:noFill/>
+        </p:spPr>
+        <p:txBody>
+          <a:bodyPr wrap="square" rtlCol="0">
+            <a:spAutoFit/>
+          </a:bodyPr>
+          <a:lstStyle/>
+          <a:p>
+            <a:r>
+              <a:rPr lang="en-US" sz="800" dirty="0"/>
+              <a:t>1:M</a:t>
+            </a:r>
+          </a:p>
+        </p:txBody>
+      </p:sp>
     </p:spTree>
     <p:extLst>
       <p:ext uri="{BB962C8B-B14F-4D97-AF65-F5344CB8AC3E}">
@@ -28568,6 +28776,82 @@
           </a:p>
         </p:txBody>
       </p:sp>
+      <p:cxnSp>
+        <p:nvCxnSpPr>
+          <p:cNvPr id="18" name="Straight Connector 17">
+            <a:extLst>
+              <a:ext uri="{FF2B5EF4-FFF2-40B4-BE49-F238E27FC236}">
+                <a16:creationId xmlns:a16="http://schemas.microsoft.com/office/drawing/2014/main" id="{9BB3121E-15B7-ACAA-620E-C516C58F4A14}"/>
+              </a:ext>
+            </a:extLst>
+          </p:cNvPr>
+          <p:cNvCxnSpPr>
+            <a:cxnSpLocks/>
+          </p:cNvCxnSpPr>
+          <p:nvPr/>
+        </p:nvCxnSpPr>
+        <p:spPr>
+          <a:xfrm flipV="1">
+            <a:off x="3982484" y="6077990"/>
+            <a:ext cx="0" cy="378414"/>
+          </a:xfrm>
+          <a:prstGeom prst="line">
+            <a:avLst/>
+          </a:prstGeom>
+          <a:ln>
+            <a:prstDash val="sysDash"/>
+          </a:ln>
+        </p:spPr>
+        <p:style>
+          <a:lnRef idx="2">
+            <a:schemeClr val="accent1"/>
+          </a:lnRef>
+          <a:fillRef idx="0">
+            <a:schemeClr val="accent1"/>
+          </a:fillRef>
+          <a:effectRef idx="1">
+            <a:schemeClr val="accent1"/>
+          </a:effectRef>
+          <a:fontRef idx="minor">
+            <a:schemeClr val="tx1"/>
+          </a:fontRef>
+        </p:style>
+      </p:cxnSp>
+      <p:sp>
+        <p:nvSpPr>
+          <p:cNvPr id="19" name="TextBox 18">
+            <a:extLst>
+              <a:ext uri="{FF2B5EF4-FFF2-40B4-BE49-F238E27FC236}">
+                <a16:creationId xmlns:a16="http://schemas.microsoft.com/office/drawing/2014/main" id="{98824F6E-40B3-3EE3-5AC3-6D6C55FF4EDF}"/>
+              </a:ext>
+            </a:extLst>
+          </p:cNvPr>
+          <p:cNvSpPr txBox="1"/>
+          <p:nvPr/>
+        </p:nvSpPr>
+        <p:spPr>
+          <a:xfrm>
+            <a:off x="4047272" y="6118777"/>
+            <a:ext cx="579407" cy="215444"/>
+          </a:xfrm>
+          <a:prstGeom prst="rect">
+            <a:avLst/>
+          </a:prstGeom>
+          <a:noFill/>
+        </p:spPr>
+        <p:txBody>
+          <a:bodyPr wrap="square" rtlCol="0">
+            <a:spAutoFit/>
+          </a:bodyPr>
+          <a:lstStyle/>
+          <a:p>
+            <a:r>
+              <a:rPr lang="en-US" sz="800" dirty="0"/>
+              <a:t>1:M</a:t>
+            </a:r>
+          </a:p>
+        </p:txBody>
+      </p:sp>
       <p:graphicFrame>
         <p:nvGraphicFramePr>
           <p:cNvPr id="9" name="Diagram 8">
@@ -28581,7 +28865,7 @@
           <p:nvPr>
             <p:extLst>
               <p:ext uri="{D42A27DB-BD31-4B8C-83A1-F6EECF244321}">
-                <p14:modId xmlns:p14="http://schemas.microsoft.com/office/powerpoint/2010/main" val="1141563357"/>
+                <p14:modId xmlns:p14="http://schemas.microsoft.com/office/powerpoint/2010/main" val="991486074"/>
               </p:ext>
             </p:extLst>
           </p:nvPr>

</xml_diff>